<commit_message>
Added system overview slides
</commit_message>
<xml_diff>
--- a/platform/UTS_SystemOverview.pptx
+++ b/platform/UTS_SystemOverview.pptx
@@ -5,10 +5,16 @@
     <p:sldMasterId id="2147483660" r:id="rId1"/>
   </p:sldMasterIdLst>
   <p:notesMasterIdLst>
-    <p:notesMasterId r:id="rId3"/>
+    <p:notesMasterId r:id="rId9"/>
   </p:notesMasterIdLst>
   <p:sldIdLst>
     <p:sldId id="256" r:id="rId2"/>
+    <p:sldId id="258" r:id="rId3"/>
+    <p:sldId id="257" r:id="rId4"/>
+    <p:sldId id="262" r:id="rId5"/>
+    <p:sldId id="261" r:id="rId6"/>
+    <p:sldId id="259" r:id="rId7"/>
+    <p:sldId id="260" r:id="rId8"/>
   </p:sldIdLst>
   <p:sldSz cx="12192000" cy="6858000"/>
   <p:notesSz cx="6858000" cy="9144000"/>
@@ -107,6 +113,11 @@
       </a:defRPr>
     </a:lvl9pPr>
   </p:defaultTextStyle>
+  <p:extLst>
+    <p:ext uri="{EFAFB233-063F-42B5-8137-9DF3F51BA10A}">
+      <p15:sldGuideLst xmlns:p15="http://schemas.microsoft.com/office/powerpoint/2012/main"/>
+    </p:ext>
+  </p:extLst>
 </p:presentation>
 </file>
 
@@ -192,7 +203,7 @@
           <a:p>
             <a:fld id="{B3B94081-C4A3-44FE-BD72-BE546CAF8935}" type="datetimeFigureOut">
               <a:rPr lang="en-GB" smtClean="0"/>
-              <a:t>13/09/2021</a:t>
+              <a:t>14/09/2021</a:t>
             </a:fld>
             <a:endParaRPr lang="en-GB"/>
           </a:p>
@@ -615,7 +626,7 @@
           <a:p>
             <a:fld id="{19DB0E3A-21DB-4FD7-A3B7-B0158D19ED14}" type="datetime1">
               <a:rPr lang="en-GB" smtClean="0"/>
-              <a:t>13/09/2021</a:t>
+              <a:t>14/09/2021</a:t>
             </a:fld>
             <a:endParaRPr lang="en-GB"/>
           </a:p>
@@ -819,7 +830,7 @@
           <a:p>
             <a:fld id="{A90BECFA-D09E-4452-AC0B-2BFA5F8B588A}" type="datetime1">
               <a:rPr lang="en-GB" smtClean="0"/>
-              <a:t>13/09/2021</a:t>
+              <a:t>14/09/2021</a:t>
             </a:fld>
             <a:endParaRPr lang="en-GB"/>
           </a:p>
@@ -1032,7 +1043,7 @@
           <a:p>
             <a:fld id="{FBDF0139-47DC-4255-B867-4558F1EC3EC1}" type="datetime1">
               <a:rPr lang="en-GB" smtClean="0"/>
-              <a:t>13/09/2021</a:t>
+              <a:t>14/09/2021</a:t>
             </a:fld>
             <a:endParaRPr lang="en-GB"/>
           </a:p>
@@ -1235,7 +1246,7 @@
           <a:p>
             <a:fld id="{2CEFAB21-F00B-4CEB-BF38-C9F4F8AC8966}" type="datetime1">
               <a:rPr lang="en-GB" smtClean="0"/>
-              <a:t>13/09/2021</a:t>
+              <a:t>14/09/2021</a:t>
             </a:fld>
             <a:endParaRPr lang="en-GB"/>
           </a:p>
@@ -1510,7 +1521,7 @@
           <a:p>
             <a:fld id="{EC37ADDD-5A61-41F7-85AD-8DA16BAE4289}" type="datetime1">
               <a:rPr lang="en-GB" smtClean="0"/>
-              <a:t>13/09/2021</a:t>
+              <a:t>14/09/2021</a:t>
             </a:fld>
             <a:endParaRPr lang="en-GB"/>
           </a:p>
@@ -1844,7 +1855,7 @@
           <a:p>
             <a:fld id="{64638756-75D3-4B12-93AC-2C092CF2B78C}" type="datetime1">
               <a:rPr lang="en-GB" smtClean="0"/>
-              <a:t>13/09/2021</a:t>
+              <a:t>14/09/2021</a:t>
             </a:fld>
             <a:endParaRPr lang="en-GB"/>
           </a:p>
@@ -2262,7 +2273,7 @@
           <a:p>
             <a:fld id="{E7B9996B-0B0C-4B1A-B300-46F205F00364}" type="datetime1">
               <a:rPr lang="en-GB" smtClean="0"/>
-              <a:t>13/09/2021</a:t>
+              <a:t>14/09/2021</a:t>
             </a:fld>
             <a:endParaRPr lang="en-GB"/>
           </a:p>
@@ -2407,7 +2418,7 @@
           <a:p>
             <a:fld id="{99F34203-DAFB-4929-A64E-04F404087269}" type="datetime1">
               <a:rPr lang="en-GB" smtClean="0"/>
-              <a:t>13/09/2021</a:t>
+              <a:t>14/09/2021</a:t>
             </a:fld>
             <a:endParaRPr lang="en-GB"/>
           </a:p>
@@ -2523,7 +2534,7 @@
           <a:p>
             <a:fld id="{92C9D7EC-7D67-4AD5-A9A2-D52BD6D60EB7}" type="datetime1">
               <a:rPr lang="en-GB" smtClean="0"/>
-              <a:t>13/09/2021</a:t>
+              <a:t>14/09/2021</a:t>
             </a:fld>
             <a:endParaRPr lang="en-GB"/>
           </a:p>
@@ -2839,7 +2850,7 @@
           <a:p>
             <a:fld id="{80D6F779-D514-4A85-ACDC-97ABE9B1BC03}" type="datetime1">
               <a:rPr lang="en-GB" smtClean="0"/>
-              <a:t>13/09/2021</a:t>
+              <a:t>14/09/2021</a:t>
             </a:fld>
             <a:endParaRPr lang="en-GB"/>
           </a:p>
@@ -3135,7 +3146,7 @@
           <a:p>
             <a:fld id="{07BE60F1-9E53-48CC-91C8-A0FDC2C506A4}" type="datetime1">
               <a:rPr lang="en-GB" smtClean="0"/>
-              <a:t>13/09/2021</a:t>
+              <a:t>14/09/2021</a:t>
             </a:fld>
             <a:endParaRPr lang="en-GB"/>
           </a:p>
@@ -3381,7 +3392,7 @@
           <a:p>
             <a:fld id="{48E57B69-0FD3-427C-A2AF-D1895BA90C78}" type="datetime1">
               <a:rPr lang="en-GB" smtClean="0"/>
-              <a:t>13/09/2021</a:t>
+              <a:t>14/09/2021</a:t>
             </a:fld>
             <a:endParaRPr lang="en-GB"/>
           </a:p>
@@ -3933,7 +3944,10 @@
           <a:bodyPr/>
           <a:lstStyle/>
           <a:p>
-            <a:endParaRPr lang="en-GB" dirty="0"/>
+            <a:r>
+              <a:rPr lang="en-GB" dirty="0"/>
+              <a:t>University of Southampton Small Satellite (UoS3)</a:t>
+            </a:r>
           </a:p>
         </p:txBody>
       </p:sp>
@@ -4008,6 +4022,2022 @@
     <p:extLst>
       <p:ext uri="{BB962C8B-B14F-4D97-AF65-F5344CB8AC3E}">
         <p14:creationId xmlns:p14="http://schemas.microsoft.com/office/powerpoint/2010/main" val="4163233670"/>
+      </p:ext>
+    </p:extLst>
+  </p:cSld>
+  <p:clrMapOvr>
+    <a:masterClrMapping/>
+  </p:clrMapOvr>
+</p:sld>
+</file>
+
+<file path=ppt/slides/slide2.xml><?xml version="1.0" encoding="utf-8"?>
+<p:sld xmlns:a="http://schemas.openxmlformats.org/drawingml/2006/main" xmlns:r="http://schemas.openxmlformats.org/officeDocument/2006/relationships" xmlns:p="http://schemas.openxmlformats.org/presentationml/2006/main">
+  <p:cSld>
+    <p:spTree>
+      <p:nvGrpSpPr>
+        <p:cNvPr id="1" name=""/>
+        <p:cNvGrpSpPr/>
+        <p:nvPr/>
+      </p:nvGrpSpPr>
+      <p:grpSpPr>
+        <a:xfrm>
+          <a:off x="0" y="0"/>
+          <a:ext cx="0" cy="0"/>
+          <a:chOff x="0" y="0"/>
+          <a:chExt cx="0" cy="0"/>
+        </a:xfrm>
+      </p:grpSpPr>
+      <p:sp>
+        <p:nvSpPr>
+          <p:cNvPr id="2" name="Title 1">
+            <a:extLst>
+              <a:ext uri="{FF2B5EF4-FFF2-40B4-BE49-F238E27FC236}">
+                <a16:creationId xmlns:a16="http://schemas.microsoft.com/office/drawing/2014/main" id="{E6C018CB-14BF-4DBB-94EC-9B5A2A0A9011}"/>
+              </a:ext>
+            </a:extLst>
+          </p:cNvPr>
+          <p:cNvSpPr>
+            <a:spLocks noGrp="1"/>
+          </p:cNvSpPr>
+          <p:nvPr>
+            <p:ph type="title"/>
+          </p:nvPr>
+        </p:nvSpPr>
+        <p:spPr/>
+        <p:txBody>
+          <a:bodyPr/>
+          <a:lstStyle/>
+          <a:p>
+            <a:r>
+              <a:rPr lang="en-GB" dirty="0"/>
+              <a:t>History</a:t>
+            </a:r>
+          </a:p>
+        </p:txBody>
+      </p:sp>
+      <p:sp>
+        <p:nvSpPr>
+          <p:cNvPr id="3" name="Content Placeholder 2">
+            <a:extLst>
+              <a:ext uri="{FF2B5EF4-FFF2-40B4-BE49-F238E27FC236}">
+                <a16:creationId xmlns:a16="http://schemas.microsoft.com/office/drawing/2014/main" id="{CDDD6C95-24DA-4A96-85FE-AF068ABE7DE0}"/>
+              </a:ext>
+            </a:extLst>
+          </p:cNvPr>
+          <p:cNvSpPr>
+            <a:spLocks noGrp="1"/>
+          </p:cNvSpPr>
+          <p:nvPr>
+            <p:ph idx="1"/>
+          </p:nvPr>
+        </p:nvSpPr>
+        <p:spPr/>
+        <p:txBody>
+          <a:bodyPr/>
+          <a:lstStyle/>
+          <a:p>
+            <a:r>
+              <a:rPr lang="en-GB" dirty="0"/>
+              <a:t>1U (10x10x10 cm) research CubeSat  started in 2014</a:t>
+            </a:r>
+          </a:p>
+          <a:p>
+            <a:r>
+              <a:rPr lang="en-GB" dirty="0"/>
+              <a:t>Designed by 4</a:t>
+            </a:r>
+            <a:r>
+              <a:rPr lang="en-GB" baseline="30000" dirty="0"/>
+              <a:t>th</a:t>
+            </a:r>
+            <a:r>
+              <a:rPr lang="en-GB" dirty="0"/>
+              <a:t> year Group Design Project (GDP) students</a:t>
+            </a:r>
+          </a:p>
+          <a:p>
+            <a:r>
+              <a:rPr lang="en-GB" dirty="0"/>
+              <a:t>Previously part of ESA’s Fly Your Satellite! (FYS) programme</a:t>
+            </a:r>
+          </a:p>
+          <a:p>
+            <a:endParaRPr lang="en-GB" dirty="0"/>
+          </a:p>
+          <a:p>
+            <a:r>
+              <a:rPr lang="en-GB" dirty="0"/>
+              <a:t>Work still needed on software and electronics to reach </a:t>
+            </a:r>
+            <a:r>
+              <a:rPr lang="en-GB" dirty="0" err="1"/>
+              <a:t>FlatSat</a:t>
+            </a:r>
+            <a:r>
+              <a:rPr lang="en-GB" dirty="0"/>
+              <a:t> testing</a:t>
+            </a:r>
+          </a:p>
+          <a:p>
+            <a:endParaRPr lang="en-GB" dirty="0"/>
+          </a:p>
+        </p:txBody>
+      </p:sp>
+      <p:sp>
+        <p:nvSpPr>
+          <p:cNvPr id="4" name="Footer Placeholder 3">
+            <a:extLst>
+              <a:ext uri="{FF2B5EF4-FFF2-40B4-BE49-F238E27FC236}">
+                <a16:creationId xmlns:a16="http://schemas.microsoft.com/office/drawing/2014/main" id="{439ACB6D-8FF1-4864-AC06-600151ED6C2F}"/>
+              </a:ext>
+            </a:extLst>
+          </p:cNvPr>
+          <p:cNvSpPr>
+            <a:spLocks noGrp="1"/>
+          </p:cNvSpPr>
+          <p:nvPr>
+            <p:ph type="ftr" sz="quarter" idx="11"/>
+          </p:nvPr>
+        </p:nvSpPr>
+        <p:spPr/>
+        <p:txBody>
+          <a:bodyPr/>
+          <a:lstStyle/>
+          <a:p>
+            <a:r>
+              <a:rPr lang="en-GB"/>
+              <a:t>SUSF – UoS3 Training Scheme</a:t>
+            </a:r>
+          </a:p>
+        </p:txBody>
+      </p:sp>
+      <p:sp>
+        <p:nvSpPr>
+          <p:cNvPr id="5" name="Slide Number Placeholder 4">
+            <a:extLst>
+              <a:ext uri="{FF2B5EF4-FFF2-40B4-BE49-F238E27FC236}">
+                <a16:creationId xmlns:a16="http://schemas.microsoft.com/office/drawing/2014/main" id="{E2D11665-6F70-4F89-AAB2-C2555CD64777}"/>
+              </a:ext>
+            </a:extLst>
+          </p:cNvPr>
+          <p:cNvSpPr>
+            <a:spLocks noGrp="1"/>
+          </p:cNvSpPr>
+          <p:nvPr>
+            <p:ph type="sldNum" sz="quarter" idx="12"/>
+          </p:nvPr>
+        </p:nvSpPr>
+        <p:spPr/>
+        <p:txBody>
+          <a:bodyPr/>
+          <a:lstStyle/>
+          <a:p>
+            <a:fld id="{409D42ED-5227-461B-93AD-5F9E0026A866}" type="slidenum">
+              <a:rPr lang="en-GB" smtClean="0"/>
+              <a:t>2</a:t>
+            </a:fld>
+            <a:endParaRPr lang="en-GB"/>
+          </a:p>
+        </p:txBody>
+      </p:sp>
+    </p:spTree>
+    <p:extLst>
+      <p:ext uri="{BB962C8B-B14F-4D97-AF65-F5344CB8AC3E}">
+        <p14:creationId xmlns:p14="http://schemas.microsoft.com/office/powerpoint/2010/main" val="908905226"/>
+      </p:ext>
+    </p:extLst>
+  </p:cSld>
+  <p:clrMapOvr>
+    <a:masterClrMapping/>
+  </p:clrMapOvr>
+</p:sld>
+</file>
+
+<file path=ppt/slides/slide3.xml><?xml version="1.0" encoding="utf-8"?>
+<p:sld xmlns:a="http://schemas.openxmlformats.org/drawingml/2006/main" xmlns:r="http://schemas.openxmlformats.org/officeDocument/2006/relationships" xmlns:p="http://schemas.openxmlformats.org/presentationml/2006/main">
+  <p:cSld>
+    <p:spTree>
+      <p:nvGrpSpPr>
+        <p:cNvPr id="1" name=""/>
+        <p:cNvGrpSpPr/>
+        <p:nvPr/>
+      </p:nvGrpSpPr>
+      <p:grpSpPr>
+        <a:xfrm>
+          <a:off x="0" y="0"/>
+          <a:ext cx="0" cy="0"/>
+          <a:chOff x="0" y="0"/>
+          <a:chExt cx="0" cy="0"/>
+        </a:xfrm>
+      </p:grpSpPr>
+      <p:sp>
+        <p:nvSpPr>
+          <p:cNvPr id="2" name="Title 1">
+            <a:extLst>
+              <a:ext uri="{FF2B5EF4-FFF2-40B4-BE49-F238E27FC236}">
+                <a16:creationId xmlns:a16="http://schemas.microsoft.com/office/drawing/2014/main" id="{1334D5D0-28A9-411A-8205-7296201C5B28}"/>
+              </a:ext>
+            </a:extLst>
+          </p:cNvPr>
+          <p:cNvSpPr>
+            <a:spLocks noGrp="1"/>
+          </p:cNvSpPr>
+          <p:nvPr>
+            <p:ph type="title"/>
+          </p:nvPr>
+        </p:nvSpPr>
+        <p:spPr/>
+        <p:txBody>
+          <a:bodyPr/>
+          <a:lstStyle/>
+          <a:p>
+            <a:r>
+              <a:rPr lang="en-GB" dirty="0"/>
+              <a:t>Mission</a:t>
+            </a:r>
+          </a:p>
+        </p:txBody>
+      </p:sp>
+      <p:sp>
+        <p:nvSpPr>
+          <p:cNvPr id="3" name="Content Placeholder 2">
+            <a:extLst>
+              <a:ext uri="{FF2B5EF4-FFF2-40B4-BE49-F238E27FC236}">
+                <a16:creationId xmlns:a16="http://schemas.microsoft.com/office/drawing/2014/main" id="{15D484F0-B6C9-44D6-B431-00D99199F62F}"/>
+              </a:ext>
+            </a:extLst>
+          </p:cNvPr>
+          <p:cNvSpPr>
+            <a:spLocks noGrp="1"/>
+          </p:cNvSpPr>
+          <p:nvPr>
+            <p:ph idx="1"/>
+          </p:nvPr>
+        </p:nvSpPr>
+        <p:spPr>
+          <a:xfrm>
+            <a:off x="838200" y="1825626"/>
+            <a:ext cx="10515600" cy="4199160"/>
+          </a:xfrm>
+        </p:spPr>
+        <p:txBody>
+          <a:bodyPr/>
+          <a:lstStyle/>
+          <a:p>
+            <a:r>
+              <a:rPr lang="en-GB" dirty="0">
+                <a:solidFill>
+                  <a:schemeClr val="accent6"/>
+                </a:solidFill>
+              </a:rPr>
+              <a:t>Scientific</a:t>
+            </a:r>
+            <a:r>
+              <a:rPr lang="en-GB" dirty="0"/>
+              <a:t> – </a:t>
+            </a:r>
+            <a:r>
+              <a:rPr lang="en-GB" sz="2400" dirty="0"/>
+              <a:t>to collect position and attitude data over the mission lifetime to assist space debris re-entry research at Southampton</a:t>
+            </a:r>
+          </a:p>
+          <a:p>
+            <a:endParaRPr lang="en-GB" sz="2400" dirty="0"/>
+          </a:p>
+          <a:p>
+            <a:r>
+              <a:rPr lang="en-GB" dirty="0">
+                <a:solidFill>
+                  <a:schemeClr val="accent6"/>
+                </a:solidFill>
+              </a:rPr>
+              <a:t>Outreach</a:t>
+            </a:r>
+            <a:r>
+              <a:rPr lang="en-GB" dirty="0"/>
+              <a:t> – </a:t>
+            </a:r>
+            <a:r>
+              <a:rPr lang="en-GB" sz="2400" dirty="0"/>
+              <a:t>to capture images of Europe and transmit a telemetry beacon for public outreach</a:t>
+            </a:r>
+          </a:p>
+          <a:p>
+            <a:endParaRPr lang="en-GB" sz="2400" dirty="0"/>
+          </a:p>
+          <a:p>
+            <a:r>
+              <a:rPr lang="en-GB" dirty="0">
+                <a:solidFill>
+                  <a:schemeClr val="accent6"/>
+                </a:solidFill>
+              </a:rPr>
+              <a:t>Educational</a:t>
+            </a:r>
+            <a:r>
+              <a:rPr lang="en-GB" dirty="0"/>
+              <a:t> – </a:t>
+            </a:r>
+            <a:r>
+              <a:rPr lang="en-GB" sz="2400" dirty="0"/>
+              <a:t>provide students with experience of industry-standard design processes, and to get hands-on experience with space-grade hardware</a:t>
+            </a:r>
+            <a:endParaRPr lang="en-GB" dirty="0"/>
+          </a:p>
+        </p:txBody>
+      </p:sp>
+      <p:sp>
+        <p:nvSpPr>
+          <p:cNvPr id="4" name="Footer Placeholder 3">
+            <a:extLst>
+              <a:ext uri="{FF2B5EF4-FFF2-40B4-BE49-F238E27FC236}">
+                <a16:creationId xmlns:a16="http://schemas.microsoft.com/office/drawing/2014/main" id="{A0EECC29-389A-4A53-88A4-763CE5BEA4B4}"/>
+              </a:ext>
+            </a:extLst>
+          </p:cNvPr>
+          <p:cNvSpPr>
+            <a:spLocks noGrp="1"/>
+          </p:cNvSpPr>
+          <p:nvPr>
+            <p:ph type="ftr" sz="quarter" idx="11"/>
+          </p:nvPr>
+        </p:nvSpPr>
+        <p:spPr/>
+        <p:txBody>
+          <a:bodyPr/>
+          <a:lstStyle/>
+          <a:p>
+            <a:r>
+              <a:rPr lang="en-GB"/>
+              <a:t>SUSF – UoS3 Training Scheme</a:t>
+            </a:r>
+          </a:p>
+        </p:txBody>
+      </p:sp>
+      <p:sp>
+        <p:nvSpPr>
+          <p:cNvPr id="5" name="Slide Number Placeholder 4">
+            <a:extLst>
+              <a:ext uri="{FF2B5EF4-FFF2-40B4-BE49-F238E27FC236}">
+                <a16:creationId xmlns:a16="http://schemas.microsoft.com/office/drawing/2014/main" id="{54AB2DB5-580A-4CE2-8779-0473E14EEC03}"/>
+              </a:ext>
+            </a:extLst>
+          </p:cNvPr>
+          <p:cNvSpPr>
+            <a:spLocks noGrp="1"/>
+          </p:cNvSpPr>
+          <p:nvPr>
+            <p:ph type="sldNum" sz="quarter" idx="12"/>
+          </p:nvPr>
+        </p:nvSpPr>
+        <p:spPr/>
+        <p:txBody>
+          <a:bodyPr/>
+          <a:lstStyle/>
+          <a:p>
+            <a:fld id="{409D42ED-5227-461B-93AD-5F9E0026A866}" type="slidenum">
+              <a:rPr lang="en-GB" smtClean="0"/>
+              <a:t>3</a:t>
+            </a:fld>
+            <a:endParaRPr lang="en-GB"/>
+          </a:p>
+        </p:txBody>
+      </p:sp>
+    </p:spTree>
+    <p:extLst>
+      <p:ext uri="{BB962C8B-B14F-4D97-AF65-F5344CB8AC3E}">
+        <p14:creationId xmlns:p14="http://schemas.microsoft.com/office/powerpoint/2010/main" val="3641300877"/>
+      </p:ext>
+    </p:extLst>
+  </p:cSld>
+  <p:clrMapOvr>
+    <a:masterClrMapping/>
+  </p:clrMapOvr>
+</p:sld>
+</file>
+
+<file path=ppt/slides/slide4.xml><?xml version="1.0" encoding="utf-8"?>
+<p:sld xmlns:a="http://schemas.openxmlformats.org/drawingml/2006/main" xmlns:r="http://schemas.openxmlformats.org/officeDocument/2006/relationships" xmlns:p="http://schemas.openxmlformats.org/presentationml/2006/main">
+  <p:cSld>
+    <p:spTree>
+      <p:nvGrpSpPr>
+        <p:cNvPr id="1" name=""/>
+        <p:cNvGrpSpPr/>
+        <p:nvPr/>
+      </p:nvGrpSpPr>
+      <p:grpSpPr>
+        <a:xfrm>
+          <a:off x="0" y="0"/>
+          <a:ext cx="0" cy="0"/>
+          <a:chOff x="0" y="0"/>
+          <a:chExt cx="0" cy="0"/>
+        </a:xfrm>
+      </p:grpSpPr>
+      <p:sp>
+        <p:nvSpPr>
+          <p:cNvPr id="2" name="Title 1">
+            <a:extLst>
+              <a:ext uri="{FF2B5EF4-FFF2-40B4-BE49-F238E27FC236}">
+                <a16:creationId xmlns:a16="http://schemas.microsoft.com/office/drawing/2014/main" id="{EB89F2A4-B939-4170-AA97-118434AC454C}"/>
+              </a:ext>
+            </a:extLst>
+          </p:cNvPr>
+          <p:cNvSpPr>
+            <a:spLocks noGrp="1"/>
+          </p:cNvSpPr>
+          <p:nvPr>
+            <p:ph type="title"/>
+          </p:nvPr>
+        </p:nvSpPr>
+        <p:spPr/>
+        <p:txBody>
+          <a:bodyPr/>
+          <a:lstStyle/>
+          <a:p>
+            <a:r>
+              <a:rPr lang="en-GB" dirty="0"/>
+              <a:t>Requirements</a:t>
+            </a:r>
+          </a:p>
+        </p:txBody>
+      </p:sp>
+      <p:sp>
+        <p:nvSpPr>
+          <p:cNvPr id="3" name="Content Placeholder 2">
+            <a:extLst>
+              <a:ext uri="{FF2B5EF4-FFF2-40B4-BE49-F238E27FC236}">
+                <a16:creationId xmlns:a16="http://schemas.microsoft.com/office/drawing/2014/main" id="{09E81D10-03D9-4546-A897-DC80DC04C477}"/>
+              </a:ext>
+            </a:extLst>
+          </p:cNvPr>
+          <p:cNvSpPr>
+            <a:spLocks noGrp="1"/>
+          </p:cNvSpPr>
+          <p:nvPr>
+            <p:ph idx="1"/>
+          </p:nvPr>
+        </p:nvSpPr>
+        <p:spPr/>
+        <p:txBody>
+          <a:bodyPr>
+            <a:normAutofit fontScale="92500"/>
+          </a:bodyPr>
+          <a:lstStyle/>
+          <a:p>
+            <a:r>
+              <a:rPr lang="en-GB" dirty="0"/>
+              <a:t>Two root requirements sources:</a:t>
+            </a:r>
+          </a:p>
+          <a:p>
+            <a:pPr lvl="1"/>
+            <a:r>
+              <a:rPr lang="en-GB" dirty="0"/>
+              <a:t>ESA FYS Design Specification (FDS) – ESA requirements on the CubeSat</a:t>
+            </a:r>
+          </a:p>
+          <a:p>
+            <a:pPr lvl="2"/>
+            <a:r>
+              <a:rPr lang="en-GB" dirty="0"/>
+              <a:t>Mostly related to physical dimensions, safety of the CubeSat in the ISS launcher etc.</a:t>
+            </a:r>
+          </a:p>
+          <a:p>
+            <a:pPr lvl="1"/>
+            <a:r>
+              <a:rPr lang="en-GB" dirty="0"/>
+              <a:t>Technical Specification (TS) – UoS3 specific requirements</a:t>
+            </a:r>
+          </a:p>
+          <a:p>
+            <a:pPr lvl="2"/>
+            <a:r>
+              <a:rPr lang="en-GB" dirty="0"/>
+              <a:t>Give technical specs of the CubeSat and mission operational requirements</a:t>
+            </a:r>
+          </a:p>
+          <a:p>
+            <a:pPr lvl="2"/>
+            <a:endParaRPr lang="en-GB" dirty="0"/>
+          </a:p>
+          <a:p>
+            <a:r>
+              <a:rPr lang="en-GB" dirty="0"/>
+              <a:t>Examples of derived specifications:</a:t>
+            </a:r>
+          </a:p>
+          <a:p>
+            <a:pPr lvl="1"/>
+            <a:r>
+              <a:rPr lang="en-GB" dirty="0"/>
+              <a:t>Design Definition File (DDF) – gives detailed design of CubeSat with reasoning for design choices</a:t>
+            </a:r>
+          </a:p>
+          <a:p>
+            <a:pPr lvl="1"/>
+            <a:r>
+              <a:rPr lang="en-GB" dirty="0"/>
+              <a:t>Interface Control Document (ICD) – specifies interfaces between hardware boards </a:t>
+            </a:r>
+          </a:p>
+          <a:p>
+            <a:pPr lvl="1"/>
+            <a:r>
+              <a:rPr lang="en-GB" dirty="0"/>
+              <a:t>Software ICD – specifies interfaces between software components (i.e. EPS and OBC)</a:t>
+            </a:r>
+          </a:p>
+          <a:p>
+            <a:pPr lvl="1"/>
+            <a:endParaRPr lang="en-GB" dirty="0"/>
+          </a:p>
+        </p:txBody>
+      </p:sp>
+      <p:sp>
+        <p:nvSpPr>
+          <p:cNvPr id="4" name="Footer Placeholder 3">
+            <a:extLst>
+              <a:ext uri="{FF2B5EF4-FFF2-40B4-BE49-F238E27FC236}">
+                <a16:creationId xmlns:a16="http://schemas.microsoft.com/office/drawing/2014/main" id="{FE2032C0-7BDC-40D0-9236-CA11EFB52CEB}"/>
+              </a:ext>
+            </a:extLst>
+          </p:cNvPr>
+          <p:cNvSpPr>
+            <a:spLocks noGrp="1"/>
+          </p:cNvSpPr>
+          <p:nvPr>
+            <p:ph type="ftr" sz="quarter" idx="11"/>
+          </p:nvPr>
+        </p:nvSpPr>
+        <p:spPr/>
+        <p:txBody>
+          <a:bodyPr/>
+          <a:lstStyle/>
+          <a:p>
+            <a:r>
+              <a:rPr lang="en-GB"/>
+              <a:t>SUSF – UoS3 Training Scheme</a:t>
+            </a:r>
+          </a:p>
+        </p:txBody>
+      </p:sp>
+      <p:sp>
+        <p:nvSpPr>
+          <p:cNvPr id="5" name="Slide Number Placeholder 4">
+            <a:extLst>
+              <a:ext uri="{FF2B5EF4-FFF2-40B4-BE49-F238E27FC236}">
+                <a16:creationId xmlns:a16="http://schemas.microsoft.com/office/drawing/2014/main" id="{E036615D-7872-4A13-B732-F416BFB4A744}"/>
+              </a:ext>
+            </a:extLst>
+          </p:cNvPr>
+          <p:cNvSpPr>
+            <a:spLocks noGrp="1"/>
+          </p:cNvSpPr>
+          <p:nvPr>
+            <p:ph type="sldNum" sz="quarter" idx="12"/>
+          </p:nvPr>
+        </p:nvSpPr>
+        <p:spPr/>
+        <p:txBody>
+          <a:bodyPr/>
+          <a:lstStyle/>
+          <a:p>
+            <a:fld id="{409D42ED-5227-461B-93AD-5F9E0026A866}" type="slidenum">
+              <a:rPr lang="en-GB" smtClean="0"/>
+              <a:t>4</a:t>
+            </a:fld>
+            <a:endParaRPr lang="en-GB"/>
+          </a:p>
+        </p:txBody>
+      </p:sp>
+    </p:spTree>
+    <p:extLst>
+      <p:ext uri="{BB962C8B-B14F-4D97-AF65-F5344CB8AC3E}">
+        <p14:creationId xmlns:p14="http://schemas.microsoft.com/office/powerpoint/2010/main" val="3467752320"/>
+      </p:ext>
+    </p:extLst>
+  </p:cSld>
+  <p:clrMapOvr>
+    <a:masterClrMapping/>
+  </p:clrMapOvr>
+</p:sld>
+</file>
+
+<file path=ppt/slides/slide5.xml><?xml version="1.0" encoding="utf-8"?>
+<p:sld xmlns:a="http://schemas.openxmlformats.org/drawingml/2006/main" xmlns:r="http://schemas.openxmlformats.org/officeDocument/2006/relationships" xmlns:p="http://schemas.openxmlformats.org/presentationml/2006/main">
+  <p:cSld>
+    <p:spTree>
+      <p:nvGrpSpPr>
+        <p:cNvPr id="1" name=""/>
+        <p:cNvGrpSpPr/>
+        <p:nvPr/>
+      </p:nvGrpSpPr>
+      <p:grpSpPr>
+        <a:xfrm>
+          <a:off x="0" y="0"/>
+          <a:ext cx="0" cy="0"/>
+          <a:chOff x="0" y="0"/>
+          <a:chExt cx="0" cy="0"/>
+        </a:xfrm>
+      </p:grpSpPr>
+      <p:sp>
+        <p:nvSpPr>
+          <p:cNvPr id="2" name="Title 1">
+            <a:extLst>
+              <a:ext uri="{FF2B5EF4-FFF2-40B4-BE49-F238E27FC236}">
+                <a16:creationId xmlns:a16="http://schemas.microsoft.com/office/drawing/2014/main" id="{42567068-D688-4715-96FD-2356544A718C}"/>
+              </a:ext>
+            </a:extLst>
+          </p:cNvPr>
+          <p:cNvSpPr>
+            <a:spLocks noGrp="1"/>
+          </p:cNvSpPr>
+          <p:nvPr>
+            <p:ph type="title"/>
+          </p:nvPr>
+        </p:nvSpPr>
+        <p:spPr>
+          <a:xfrm>
+            <a:off x="838200" y="365125"/>
+            <a:ext cx="10515600" cy="1325563"/>
+          </a:xfrm>
+        </p:spPr>
+        <p:txBody>
+          <a:bodyPr anchor="ctr">
+            <a:normAutofit/>
+          </a:bodyPr>
+          <a:lstStyle/>
+          <a:p>
+            <a:r>
+              <a:rPr lang="en-GB" dirty="0"/>
+              <a:t>Subsystems</a:t>
+            </a:r>
+          </a:p>
+        </p:txBody>
+      </p:sp>
+      <p:pic>
+        <p:nvPicPr>
+          <p:cNvPr id="1026" name="Picture 2" descr="Diagram&#10;&#10;Description automatically generated">
+            <a:extLst>
+              <a:ext uri="{FF2B5EF4-FFF2-40B4-BE49-F238E27FC236}">
+                <a16:creationId xmlns:a16="http://schemas.microsoft.com/office/drawing/2014/main" id="{6519A92D-FBA5-41F8-8180-85C6358B3412}"/>
+              </a:ext>
+            </a:extLst>
+          </p:cNvPr>
+          <p:cNvPicPr>
+            <a:picLocks noChangeAspect="1" noChangeArrowheads="1"/>
+          </p:cNvPicPr>
+          <p:nvPr/>
+        </p:nvPicPr>
+        <p:blipFill>
+          <a:blip r:embed="rId2">
+            <a:extLst>
+              <a:ext uri="{28A0092B-C50C-407E-A947-70E740481C1C}">
+                <a14:useLocalDpi xmlns:a14="http://schemas.microsoft.com/office/drawing/2010/main" val="0"/>
+              </a:ext>
+            </a:extLst>
+          </a:blip>
+          <a:stretch>
+            <a:fillRect/>
+          </a:stretch>
+        </p:blipFill>
+        <p:spPr bwMode="auto">
+          <a:xfrm>
+            <a:off x="0" y="1497404"/>
+            <a:ext cx="3392680" cy="4679559"/>
+          </a:xfrm>
+          <a:prstGeom prst="rect">
+            <a:avLst/>
+          </a:prstGeom>
+          <a:solidFill>
+            <a:srgbClr val="FFFFFF"/>
+          </a:solidFill>
+        </p:spPr>
+      </p:pic>
+      <p:sp>
+        <p:nvSpPr>
+          <p:cNvPr id="71" name="Content Placeholder 3">
+            <a:extLst>
+              <a:ext uri="{FF2B5EF4-FFF2-40B4-BE49-F238E27FC236}">
+                <a16:creationId xmlns:a16="http://schemas.microsoft.com/office/drawing/2014/main" id="{B01C0B0B-B025-4A44-A2E0-449F2014AE18}"/>
+              </a:ext>
+            </a:extLst>
+          </p:cNvPr>
+          <p:cNvSpPr>
+            <a:spLocks noGrp="1"/>
+          </p:cNvSpPr>
+          <p:nvPr>
+            <p:ph sz="half" idx="2"/>
+          </p:nvPr>
+        </p:nvSpPr>
+        <p:spPr>
+          <a:xfrm>
+            <a:off x="3666146" y="1825625"/>
+            <a:ext cx="7687654" cy="4351338"/>
+          </a:xfrm>
+        </p:spPr>
+        <p:txBody>
+          <a:bodyPr>
+            <a:normAutofit fontScale="85000" lnSpcReduction="20000"/>
+          </a:bodyPr>
+          <a:lstStyle/>
+          <a:p>
+            <a:r>
+              <a:rPr lang="en-US" dirty="0">
+                <a:solidFill>
+                  <a:schemeClr val="accent6"/>
+                </a:solidFill>
+              </a:rPr>
+              <a:t>Structure</a:t>
+            </a:r>
+            <a:r>
+              <a:rPr lang="en-US" dirty="0"/>
+              <a:t> </a:t>
+            </a:r>
+            <a:endParaRPr lang="en-US" sz="2200" dirty="0"/>
+          </a:p>
+          <a:p>
+            <a:pPr marL="457200" lvl="1" indent="0">
+              <a:buNone/>
+            </a:pPr>
+            <a:r>
+              <a:rPr lang="en-US" sz="1800" dirty="0"/>
+              <a:t>supports the CubeSat’s components</a:t>
+            </a:r>
+          </a:p>
+          <a:p>
+            <a:r>
+              <a:rPr lang="en-US" dirty="0">
+                <a:solidFill>
+                  <a:schemeClr val="accent6"/>
+                </a:solidFill>
+              </a:rPr>
+              <a:t>Antenna Deployment Mechanism (ADM)</a:t>
+            </a:r>
+            <a:r>
+              <a:rPr lang="en-US" dirty="0"/>
+              <a:t> </a:t>
+            </a:r>
+            <a:endParaRPr lang="en-US" sz="2200" dirty="0"/>
+          </a:p>
+          <a:p>
+            <a:pPr marL="457200" lvl="1" indent="0">
+              <a:buNone/>
+            </a:pPr>
+            <a:r>
+              <a:rPr lang="en-US" sz="1800" dirty="0"/>
+              <a:t>allows the antenna to be extended after deployment from the ISS</a:t>
+            </a:r>
+          </a:p>
+          <a:p>
+            <a:r>
+              <a:rPr lang="en-US" dirty="0">
+                <a:solidFill>
+                  <a:schemeClr val="accent6"/>
+                </a:solidFill>
+              </a:rPr>
+              <a:t>Electrical Power Subsystem (EPS) </a:t>
+            </a:r>
+            <a:endParaRPr lang="en-US" sz="2200" dirty="0">
+              <a:solidFill>
+                <a:schemeClr val="accent6"/>
+              </a:solidFill>
+            </a:endParaRPr>
+          </a:p>
+          <a:p>
+            <a:pPr marL="457200" lvl="1" indent="0">
+              <a:buNone/>
+            </a:pPr>
+            <a:r>
+              <a:rPr lang="en-US" sz="1800" dirty="0"/>
+              <a:t>collects and provides regulated power to the rest of the satellite</a:t>
+            </a:r>
+          </a:p>
+          <a:p>
+            <a:r>
+              <a:rPr lang="en-US" dirty="0">
+                <a:solidFill>
+                  <a:schemeClr val="accent6"/>
+                </a:solidFill>
+              </a:rPr>
+              <a:t>Onboard Computer (OBC) </a:t>
+            </a:r>
+            <a:endParaRPr lang="en-US" sz="2200" dirty="0">
+              <a:solidFill>
+                <a:schemeClr val="accent6"/>
+              </a:solidFill>
+            </a:endParaRPr>
+          </a:p>
+          <a:p>
+            <a:pPr marL="457200" lvl="1" indent="0">
+              <a:buNone/>
+            </a:pPr>
+            <a:r>
+              <a:rPr lang="en-US" sz="1800" dirty="0"/>
+              <a:t>controls other subsystems and executes the flight software</a:t>
+            </a:r>
+          </a:p>
+          <a:p>
+            <a:r>
+              <a:rPr lang="en-US" dirty="0">
+                <a:solidFill>
+                  <a:schemeClr val="accent6"/>
+                </a:solidFill>
+              </a:rPr>
+              <a:t>Payload</a:t>
+            </a:r>
+            <a:r>
+              <a:rPr lang="en-US" dirty="0"/>
+              <a:t> </a:t>
+            </a:r>
+            <a:endParaRPr lang="en-US" sz="2200" dirty="0"/>
+          </a:p>
+          <a:p>
+            <a:pPr marL="457200" lvl="1" indent="0">
+              <a:buNone/>
+            </a:pPr>
+            <a:r>
+              <a:rPr lang="en-US" sz="1800" dirty="0"/>
+              <a:t>collects data to fulfil the mission objectives</a:t>
+            </a:r>
+          </a:p>
+          <a:p>
+            <a:r>
+              <a:rPr lang="en-US" dirty="0">
+                <a:solidFill>
+                  <a:schemeClr val="accent6"/>
+                </a:solidFill>
+              </a:rPr>
+              <a:t>Telemetry, Tracking, and Command (TT&amp;C) </a:t>
+            </a:r>
+            <a:endParaRPr lang="en-US" sz="2200" dirty="0">
+              <a:solidFill>
+                <a:schemeClr val="accent6"/>
+              </a:solidFill>
+            </a:endParaRPr>
+          </a:p>
+          <a:p>
+            <a:pPr marL="457200" lvl="1" indent="0">
+              <a:buNone/>
+            </a:pPr>
+            <a:r>
+              <a:rPr lang="en-US" sz="1800" dirty="0"/>
+              <a:t>provides 2-way communications between the satellite and ground</a:t>
+            </a:r>
+          </a:p>
+          <a:p>
+            <a:r>
+              <a:rPr lang="en-US" dirty="0">
+                <a:solidFill>
+                  <a:schemeClr val="accent6"/>
+                </a:solidFill>
+              </a:rPr>
+              <a:t>Attitude and Orbital Control Subsystem (AOCS) </a:t>
+            </a:r>
+            <a:endParaRPr lang="en-US" sz="2200" dirty="0">
+              <a:solidFill>
+                <a:schemeClr val="accent6"/>
+              </a:solidFill>
+            </a:endParaRPr>
+          </a:p>
+          <a:p>
+            <a:pPr marL="457200" lvl="1" indent="0">
+              <a:buNone/>
+            </a:pPr>
+            <a:r>
+              <a:rPr lang="en-US" sz="1800" dirty="0"/>
+              <a:t>passively controls the attitude (orientation) of the satellite</a:t>
+            </a:r>
+          </a:p>
+          <a:p>
+            <a:endParaRPr lang="en-US" dirty="0"/>
+          </a:p>
+        </p:txBody>
+      </p:sp>
+      <p:sp>
+        <p:nvSpPr>
+          <p:cNvPr id="4" name="Footer Placeholder 3">
+            <a:extLst>
+              <a:ext uri="{FF2B5EF4-FFF2-40B4-BE49-F238E27FC236}">
+                <a16:creationId xmlns:a16="http://schemas.microsoft.com/office/drawing/2014/main" id="{487B6196-4564-4B85-A90D-87DC96F90B46}"/>
+              </a:ext>
+            </a:extLst>
+          </p:cNvPr>
+          <p:cNvSpPr>
+            <a:spLocks noGrp="1"/>
+          </p:cNvSpPr>
+          <p:nvPr>
+            <p:ph type="ftr" sz="quarter" idx="11"/>
+          </p:nvPr>
+        </p:nvSpPr>
+        <p:spPr>
+          <a:xfrm>
+            <a:off x="4038600" y="6356350"/>
+            <a:ext cx="4114800" cy="365125"/>
+          </a:xfrm>
+        </p:spPr>
+        <p:txBody>
+          <a:bodyPr anchor="ctr">
+            <a:normAutofit/>
+          </a:bodyPr>
+          <a:lstStyle/>
+          <a:p>
+            <a:pPr>
+              <a:spcAft>
+                <a:spcPts val="600"/>
+              </a:spcAft>
+            </a:pPr>
+            <a:r>
+              <a:rPr lang="en-GB"/>
+              <a:t>SUSF – UoS3 Training Scheme</a:t>
+            </a:r>
+          </a:p>
+        </p:txBody>
+      </p:sp>
+      <p:sp>
+        <p:nvSpPr>
+          <p:cNvPr id="5" name="Slide Number Placeholder 4">
+            <a:extLst>
+              <a:ext uri="{FF2B5EF4-FFF2-40B4-BE49-F238E27FC236}">
+                <a16:creationId xmlns:a16="http://schemas.microsoft.com/office/drawing/2014/main" id="{13B4D938-D829-4D3E-8E7F-23FDF3CC0402}"/>
+              </a:ext>
+            </a:extLst>
+          </p:cNvPr>
+          <p:cNvSpPr>
+            <a:spLocks noGrp="1"/>
+          </p:cNvSpPr>
+          <p:nvPr>
+            <p:ph type="sldNum" sz="quarter" idx="12"/>
+          </p:nvPr>
+        </p:nvSpPr>
+        <p:spPr>
+          <a:xfrm>
+            <a:off x="8610600" y="6356350"/>
+            <a:ext cx="2743200" cy="365125"/>
+          </a:xfrm>
+        </p:spPr>
+        <p:txBody>
+          <a:bodyPr anchor="ctr">
+            <a:normAutofit/>
+          </a:bodyPr>
+          <a:lstStyle/>
+          <a:p>
+            <a:pPr>
+              <a:spcAft>
+                <a:spcPts val="600"/>
+              </a:spcAft>
+            </a:pPr>
+            <a:fld id="{409D42ED-5227-461B-93AD-5F9E0026A866}" type="slidenum">
+              <a:rPr lang="en-GB" smtClean="0"/>
+              <a:pPr>
+                <a:spcAft>
+                  <a:spcPts val="600"/>
+                </a:spcAft>
+              </a:pPr>
+              <a:t>5</a:t>
+            </a:fld>
+            <a:endParaRPr lang="en-GB"/>
+          </a:p>
+        </p:txBody>
+      </p:sp>
+    </p:spTree>
+    <p:extLst>
+      <p:ext uri="{BB962C8B-B14F-4D97-AF65-F5344CB8AC3E}">
+        <p14:creationId xmlns:p14="http://schemas.microsoft.com/office/powerpoint/2010/main" val="1991984139"/>
+      </p:ext>
+    </p:extLst>
+  </p:cSld>
+  <p:clrMapOvr>
+    <a:masterClrMapping/>
+  </p:clrMapOvr>
+</p:sld>
+</file>
+
+<file path=ppt/slides/slide6.xml><?xml version="1.0" encoding="utf-8"?>
+<p:sld xmlns:a="http://schemas.openxmlformats.org/drawingml/2006/main" xmlns:r="http://schemas.openxmlformats.org/officeDocument/2006/relationships" xmlns:p="http://schemas.openxmlformats.org/presentationml/2006/main">
+  <p:cSld>
+    <p:spTree>
+      <p:nvGrpSpPr>
+        <p:cNvPr id="1" name=""/>
+        <p:cNvGrpSpPr/>
+        <p:nvPr/>
+      </p:nvGrpSpPr>
+      <p:grpSpPr>
+        <a:xfrm>
+          <a:off x="0" y="0"/>
+          <a:ext cx="0" cy="0"/>
+          <a:chOff x="0" y="0"/>
+          <a:chExt cx="0" cy="0"/>
+        </a:xfrm>
+      </p:grpSpPr>
+      <p:sp>
+        <p:nvSpPr>
+          <p:cNvPr id="2" name="Title 1">
+            <a:extLst>
+              <a:ext uri="{FF2B5EF4-FFF2-40B4-BE49-F238E27FC236}">
+                <a16:creationId xmlns:a16="http://schemas.microsoft.com/office/drawing/2014/main" id="{2275FC04-4451-4771-A0C3-3F800A7F122D}"/>
+              </a:ext>
+            </a:extLst>
+          </p:cNvPr>
+          <p:cNvSpPr>
+            <a:spLocks noGrp="1"/>
+          </p:cNvSpPr>
+          <p:nvPr>
+            <p:ph type="title"/>
+          </p:nvPr>
+        </p:nvSpPr>
+        <p:spPr/>
+        <p:txBody>
+          <a:bodyPr/>
+          <a:lstStyle/>
+          <a:p>
+            <a:r>
+              <a:rPr lang="en-GB" dirty="0"/>
+              <a:t>Subsystems Status</a:t>
+            </a:r>
+          </a:p>
+        </p:txBody>
+      </p:sp>
+      <p:sp>
+        <p:nvSpPr>
+          <p:cNvPr id="4" name="Footer Placeholder 3">
+            <a:extLst>
+              <a:ext uri="{FF2B5EF4-FFF2-40B4-BE49-F238E27FC236}">
+                <a16:creationId xmlns:a16="http://schemas.microsoft.com/office/drawing/2014/main" id="{BB56F465-0B78-4DFB-A36D-E5386ABF1AF1}"/>
+              </a:ext>
+            </a:extLst>
+          </p:cNvPr>
+          <p:cNvSpPr>
+            <a:spLocks noGrp="1"/>
+          </p:cNvSpPr>
+          <p:nvPr>
+            <p:ph type="ftr" sz="quarter" idx="11"/>
+          </p:nvPr>
+        </p:nvSpPr>
+        <p:spPr/>
+        <p:txBody>
+          <a:bodyPr/>
+          <a:lstStyle/>
+          <a:p>
+            <a:r>
+              <a:rPr lang="en-GB"/>
+              <a:t>SUSF – UoS3 Training Scheme</a:t>
+            </a:r>
+          </a:p>
+        </p:txBody>
+      </p:sp>
+      <p:sp>
+        <p:nvSpPr>
+          <p:cNvPr id="5" name="Slide Number Placeholder 4">
+            <a:extLst>
+              <a:ext uri="{FF2B5EF4-FFF2-40B4-BE49-F238E27FC236}">
+                <a16:creationId xmlns:a16="http://schemas.microsoft.com/office/drawing/2014/main" id="{D2F8DCA4-9A99-4A52-9CF9-5FE5D4064B56}"/>
+              </a:ext>
+            </a:extLst>
+          </p:cNvPr>
+          <p:cNvSpPr>
+            <a:spLocks noGrp="1"/>
+          </p:cNvSpPr>
+          <p:nvPr>
+            <p:ph type="sldNum" sz="quarter" idx="12"/>
+          </p:nvPr>
+        </p:nvSpPr>
+        <p:spPr/>
+        <p:txBody>
+          <a:bodyPr/>
+          <a:lstStyle/>
+          <a:p>
+            <a:fld id="{409D42ED-5227-461B-93AD-5F9E0026A866}" type="slidenum">
+              <a:rPr lang="en-GB" smtClean="0"/>
+              <a:t>6</a:t>
+            </a:fld>
+            <a:endParaRPr lang="en-GB"/>
+          </a:p>
+        </p:txBody>
+      </p:sp>
+      <p:graphicFrame>
+        <p:nvGraphicFramePr>
+          <p:cNvPr id="8" name="Table 8">
+            <a:extLst>
+              <a:ext uri="{FF2B5EF4-FFF2-40B4-BE49-F238E27FC236}">
+                <a16:creationId xmlns:a16="http://schemas.microsoft.com/office/drawing/2014/main" id="{9E27D99B-0745-45F1-8337-70366581E6F0}"/>
+              </a:ext>
+            </a:extLst>
+          </p:cNvPr>
+          <p:cNvGraphicFramePr>
+            <a:graphicFrameLocks noGrp="1"/>
+          </p:cNvGraphicFramePr>
+          <p:nvPr>
+            <p:extLst>
+              <p:ext uri="{D42A27DB-BD31-4B8C-83A1-F6EECF244321}">
+                <p14:modId xmlns:p14="http://schemas.microsoft.com/office/powerpoint/2010/main" val="545901011"/>
+              </p:ext>
+            </p:extLst>
+          </p:nvPr>
+        </p:nvGraphicFramePr>
+        <p:xfrm>
+          <a:off x="838200" y="1690688"/>
+          <a:ext cx="10568374" cy="3383280"/>
+        </p:xfrm>
+        <a:graphic>
+          <a:graphicData uri="http://schemas.openxmlformats.org/drawingml/2006/table">
+            <a:tbl>
+              <a:tblPr firstRow="1" bandRow="1">
+                <a:tableStyleId>{69012ECD-51FC-41F1-AA8D-1B2483CD663E}</a:tableStyleId>
+              </a:tblPr>
+              <a:tblGrid>
+                <a:gridCol w="1366615">
+                  <a:extLst>
+                    <a:ext uri="{9D8B030D-6E8A-4147-A177-3AD203B41FA5}">
+                      <a16:colId xmlns:a16="http://schemas.microsoft.com/office/drawing/2014/main" val="2367908497"/>
+                    </a:ext>
+                  </a:extLst>
+                </a:gridCol>
+                <a:gridCol w="208280">
+                  <a:extLst>
+                    <a:ext uri="{9D8B030D-6E8A-4147-A177-3AD203B41FA5}">
+                      <a16:colId xmlns:a16="http://schemas.microsoft.com/office/drawing/2014/main" val="2405880801"/>
+                    </a:ext>
+                  </a:extLst>
+                </a:gridCol>
+                <a:gridCol w="4226987">
+                  <a:extLst>
+                    <a:ext uri="{9D8B030D-6E8A-4147-A177-3AD203B41FA5}">
+                      <a16:colId xmlns:a16="http://schemas.microsoft.com/office/drawing/2014/main" val="2813893794"/>
+                    </a:ext>
+                  </a:extLst>
+                </a:gridCol>
+                <a:gridCol w="208280">
+                  <a:extLst>
+                    <a:ext uri="{9D8B030D-6E8A-4147-A177-3AD203B41FA5}">
+                      <a16:colId xmlns:a16="http://schemas.microsoft.com/office/drawing/2014/main" val="2973521342"/>
+                    </a:ext>
+                  </a:extLst>
+                </a:gridCol>
+                <a:gridCol w="4558212">
+                  <a:extLst>
+                    <a:ext uri="{9D8B030D-6E8A-4147-A177-3AD203B41FA5}">
+                      <a16:colId xmlns:a16="http://schemas.microsoft.com/office/drawing/2014/main" val="2491164842"/>
+                    </a:ext>
+                  </a:extLst>
+                </a:gridCol>
+              </a:tblGrid>
+              <a:tr h="370840">
+                <a:tc>
+                  <a:txBody>
+                    <a:bodyPr/>
+                    <a:lstStyle/>
+                    <a:p>
+                      <a:r>
+                        <a:rPr lang="en-GB" dirty="0"/>
+                        <a:t>Subsystem</a:t>
+                      </a:r>
+                    </a:p>
+                  </a:txBody>
+                  <a:tcPr/>
+                </a:tc>
+                <a:tc>
+                  <a:txBody>
+                    <a:bodyPr/>
+                    <a:lstStyle/>
+                    <a:p>
+                      <a:endParaRPr lang="en-GB" dirty="0"/>
+                    </a:p>
+                  </a:txBody>
+                  <a:tcPr/>
+                </a:tc>
+                <a:tc>
+                  <a:txBody>
+                    <a:bodyPr/>
+                    <a:lstStyle/>
+                    <a:p>
+                      <a:r>
+                        <a:rPr lang="en-GB" dirty="0"/>
+                        <a:t>Hardware Status</a:t>
+                      </a:r>
+                    </a:p>
+                  </a:txBody>
+                  <a:tcPr/>
+                </a:tc>
+                <a:tc>
+                  <a:txBody>
+                    <a:bodyPr/>
+                    <a:lstStyle/>
+                    <a:p>
+                      <a:endParaRPr lang="en-GB" dirty="0"/>
+                    </a:p>
+                  </a:txBody>
+                  <a:tcPr/>
+                </a:tc>
+                <a:tc>
+                  <a:txBody>
+                    <a:bodyPr/>
+                    <a:lstStyle/>
+                    <a:p>
+                      <a:r>
+                        <a:rPr lang="en-GB" dirty="0"/>
+                        <a:t>Software Status</a:t>
+                      </a:r>
+                    </a:p>
+                  </a:txBody>
+                  <a:tcPr/>
+                </a:tc>
+                <a:extLst>
+                  <a:ext uri="{0D108BD9-81ED-4DB2-BD59-A6C34878D82A}">
+                    <a16:rowId xmlns:a16="http://schemas.microsoft.com/office/drawing/2014/main" val="1353021069"/>
+                  </a:ext>
+                </a:extLst>
+              </a:tr>
+              <a:tr h="370840">
+                <a:tc>
+                  <a:txBody>
+                    <a:bodyPr/>
+                    <a:lstStyle/>
+                    <a:p>
+                      <a:r>
+                        <a:rPr lang="en-GB" sz="1600" dirty="0"/>
+                        <a:t>Structure</a:t>
+                      </a:r>
+                    </a:p>
+                  </a:txBody>
+                  <a:tcPr/>
+                </a:tc>
+                <a:tc>
+                  <a:txBody>
+                    <a:bodyPr/>
+                    <a:lstStyle/>
+                    <a:p>
+                      <a:endParaRPr lang="en-GB" sz="1600" dirty="0"/>
+                    </a:p>
+                  </a:txBody>
+                  <a:tcPr>
+                    <a:solidFill>
+                      <a:schemeClr val="accent6"/>
+                    </a:solidFill>
+                  </a:tcPr>
+                </a:tc>
+                <a:tc>
+                  <a:txBody>
+                    <a:bodyPr/>
+                    <a:lstStyle/>
+                    <a:p>
+                      <a:r>
+                        <a:rPr lang="en-GB" sz="1600" dirty="0"/>
+                        <a:t>Flight ready</a:t>
+                      </a:r>
+                    </a:p>
+                  </a:txBody>
+                  <a:tcPr/>
+                </a:tc>
+                <a:tc>
+                  <a:txBody>
+                    <a:bodyPr/>
+                    <a:lstStyle/>
+                    <a:p>
+                      <a:endParaRPr lang="en-GB" sz="1600" dirty="0"/>
+                    </a:p>
+                  </a:txBody>
+                  <a:tcPr>
+                    <a:solidFill>
+                      <a:schemeClr val="tx1">
+                        <a:lumMod val="50000"/>
+                        <a:lumOff val="50000"/>
+                      </a:schemeClr>
+                    </a:solidFill>
+                  </a:tcPr>
+                </a:tc>
+                <a:tc>
+                  <a:txBody>
+                    <a:bodyPr/>
+                    <a:lstStyle/>
+                    <a:p>
+                      <a:r>
+                        <a:rPr lang="en-GB" sz="1600" dirty="0"/>
+                        <a:t>N/A</a:t>
+                      </a:r>
+                    </a:p>
+                  </a:txBody>
+                  <a:tcPr/>
+                </a:tc>
+                <a:extLst>
+                  <a:ext uri="{0D108BD9-81ED-4DB2-BD59-A6C34878D82A}">
+                    <a16:rowId xmlns:a16="http://schemas.microsoft.com/office/drawing/2014/main" val="608800909"/>
+                  </a:ext>
+                </a:extLst>
+              </a:tr>
+              <a:tr h="370840">
+                <a:tc>
+                  <a:txBody>
+                    <a:bodyPr/>
+                    <a:lstStyle/>
+                    <a:p>
+                      <a:r>
+                        <a:rPr lang="en-GB" sz="1600" dirty="0"/>
+                        <a:t>ADM</a:t>
+                      </a:r>
+                    </a:p>
+                  </a:txBody>
+                  <a:tcPr/>
+                </a:tc>
+                <a:tc>
+                  <a:txBody>
+                    <a:bodyPr/>
+                    <a:lstStyle/>
+                    <a:p>
+                      <a:endParaRPr lang="en-GB" sz="1600" dirty="0"/>
+                    </a:p>
+                  </a:txBody>
+                  <a:tcPr>
+                    <a:solidFill>
+                      <a:schemeClr val="accent5"/>
+                    </a:solidFill>
+                  </a:tcPr>
+                </a:tc>
+                <a:tc>
+                  <a:txBody>
+                    <a:bodyPr/>
+                    <a:lstStyle/>
+                    <a:p>
+                      <a:r>
+                        <a:rPr lang="en-GB" sz="1600" dirty="0"/>
+                        <a:t>Engineering qualification model (EQM) ready</a:t>
+                      </a:r>
+                    </a:p>
+                  </a:txBody>
+                  <a:tcPr/>
+                </a:tc>
+                <a:tc>
+                  <a:txBody>
+                    <a:bodyPr/>
+                    <a:lstStyle/>
+                    <a:p>
+                      <a:endParaRPr lang="en-GB" sz="1600" dirty="0"/>
+                    </a:p>
+                  </a:txBody>
+                  <a:tcPr>
+                    <a:solidFill>
+                      <a:srgbClr val="C00000"/>
+                    </a:solidFill>
+                  </a:tcPr>
+                </a:tc>
+                <a:tc>
+                  <a:txBody>
+                    <a:bodyPr/>
+                    <a:lstStyle/>
+                    <a:p>
+                      <a:r>
+                        <a:rPr lang="en-GB" sz="1600" dirty="0"/>
+                        <a:t>Not implemented</a:t>
+                      </a:r>
+                    </a:p>
+                  </a:txBody>
+                  <a:tcPr/>
+                </a:tc>
+                <a:extLst>
+                  <a:ext uri="{0D108BD9-81ED-4DB2-BD59-A6C34878D82A}">
+                    <a16:rowId xmlns:a16="http://schemas.microsoft.com/office/drawing/2014/main" val="749444378"/>
+                  </a:ext>
+                </a:extLst>
+              </a:tr>
+              <a:tr h="370840">
+                <a:tc>
+                  <a:txBody>
+                    <a:bodyPr/>
+                    <a:lstStyle/>
+                    <a:p>
+                      <a:r>
+                        <a:rPr lang="en-GB" sz="1600" dirty="0"/>
+                        <a:t>EPS</a:t>
+                      </a:r>
+                    </a:p>
+                  </a:txBody>
+                  <a:tcPr/>
+                </a:tc>
+                <a:tc>
+                  <a:txBody>
+                    <a:bodyPr/>
+                    <a:lstStyle/>
+                    <a:p>
+                      <a:endParaRPr lang="en-GB" sz="1600" dirty="0"/>
+                    </a:p>
+                  </a:txBody>
+                  <a:tcPr>
+                    <a:solidFill>
+                      <a:schemeClr val="accent4"/>
+                    </a:solidFill>
+                  </a:tcPr>
+                </a:tc>
+                <a:tc>
+                  <a:txBody>
+                    <a:bodyPr/>
+                    <a:lstStyle/>
+                    <a:p>
+                      <a:r>
+                        <a:rPr lang="en-GB" sz="1600" dirty="0"/>
+                        <a:t>New boards to be ordered, design changes verified and tested</a:t>
+                      </a:r>
+                    </a:p>
+                  </a:txBody>
+                  <a:tcPr/>
+                </a:tc>
+                <a:tc>
+                  <a:txBody>
+                    <a:bodyPr/>
+                    <a:lstStyle/>
+                    <a:p>
+                      <a:endParaRPr lang="en-GB" sz="1600" dirty="0"/>
+                    </a:p>
+                  </a:txBody>
+                  <a:tcPr>
+                    <a:solidFill>
+                      <a:schemeClr val="accent4"/>
+                    </a:solidFill>
+                  </a:tcPr>
+                </a:tc>
+                <a:tc>
+                  <a:txBody>
+                    <a:bodyPr/>
+                    <a:lstStyle/>
+                    <a:p>
+                      <a:r>
+                        <a:rPr lang="en-GB" sz="1600" dirty="0"/>
+                        <a:t>Partial implementation &amp; interface tests with OBC, see eps-firmware status</a:t>
+                      </a:r>
+                    </a:p>
+                  </a:txBody>
+                  <a:tcPr/>
+                </a:tc>
+                <a:extLst>
+                  <a:ext uri="{0D108BD9-81ED-4DB2-BD59-A6C34878D82A}">
+                    <a16:rowId xmlns:a16="http://schemas.microsoft.com/office/drawing/2014/main" val="2170217049"/>
+                  </a:ext>
+                </a:extLst>
+              </a:tr>
+              <a:tr h="370840">
+                <a:tc>
+                  <a:txBody>
+                    <a:bodyPr/>
+                    <a:lstStyle/>
+                    <a:p>
+                      <a:r>
+                        <a:rPr lang="en-GB" sz="1600" dirty="0"/>
+                        <a:t>OBC</a:t>
+                      </a:r>
+                    </a:p>
+                  </a:txBody>
+                  <a:tcPr/>
+                </a:tc>
+                <a:tc>
+                  <a:txBody>
+                    <a:bodyPr/>
+                    <a:lstStyle/>
+                    <a:p>
+                      <a:endParaRPr lang="en-GB" sz="1600" dirty="0"/>
+                    </a:p>
+                  </a:txBody>
+                  <a:tcPr>
+                    <a:solidFill>
+                      <a:schemeClr val="accent4"/>
+                    </a:solidFill>
+                  </a:tcPr>
+                </a:tc>
+                <a:tc>
+                  <a:txBody>
+                    <a:bodyPr/>
+                    <a:lstStyle/>
+                    <a:p>
+                      <a:r>
+                        <a:rPr lang="en-GB" sz="1600" dirty="0"/>
+                        <a:t>New boards to be ordered, design changes verified and tested</a:t>
+                      </a:r>
+                    </a:p>
+                  </a:txBody>
+                  <a:tcPr/>
+                </a:tc>
+                <a:tc>
+                  <a:txBody>
+                    <a:bodyPr/>
+                    <a:lstStyle/>
+                    <a:p>
+                      <a:endParaRPr lang="en-GB" sz="1600" dirty="0"/>
+                    </a:p>
+                  </a:txBody>
+                  <a:tcPr>
+                    <a:solidFill>
+                      <a:schemeClr val="accent4"/>
+                    </a:solidFill>
+                  </a:tcPr>
+                </a:tc>
+                <a:tc>
+                  <a:txBody>
+                    <a:bodyPr/>
+                    <a:lstStyle/>
+                    <a:p>
+                      <a:r>
+                        <a:rPr lang="en-GB" sz="1600" dirty="0"/>
+                        <a:t>In development</a:t>
+                      </a:r>
+                    </a:p>
+                  </a:txBody>
+                  <a:tcPr/>
+                </a:tc>
+                <a:extLst>
+                  <a:ext uri="{0D108BD9-81ED-4DB2-BD59-A6C34878D82A}">
+                    <a16:rowId xmlns:a16="http://schemas.microsoft.com/office/drawing/2014/main" val="2729433982"/>
+                  </a:ext>
+                </a:extLst>
+              </a:tr>
+              <a:tr h="370840">
+                <a:tc>
+                  <a:txBody>
+                    <a:bodyPr/>
+                    <a:lstStyle/>
+                    <a:p>
+                      <a:r>
+                        <a:rPr lang="en-GB" sz="1600" dirty="0"/>
+                        <a:t>Payload</a:t>
+                      </a:r>
+                    </a:p>
+                  </a:txBody>
+                  <a:tcPr/>
+                </a:tc>
+                <a:tc>
+                  <a:txBody>
+                    <a:bodyPr/>
+                    <a:lstStyle/>
+                    <a:p>
+                      <a:endParaRPr lang="en-GB" sz="1600" dirty="0"/>
+                    </a:p>
+                  </a:txBody>
+                  <a:tcPr>
+                    <a:solidFill>
+                      <a:schemeClr val="accent5"/>
+                    </a:solidFill>
+                  </a:tcPr>
+                </a:tc>
+                <a:tc>
+                  <a:txBody>
+                    <a:bodyPr/>
+                    <a:lstStyle/>
+                    <a:p>
+                      <a:r>
+                        <a:rPr lang="en-GB" sz="1600" dirty="0"/>
+                        <a:t>EQM models available</a:t>
+                      </a:r>
+                    </a:p>
+                  </a:txBody>
+                  <a:tcPr/>
+                </a:tc>
+                <a:tc>
+                  <a:txBody>
+                    <a:bodyPr/>
+                    <a:lstStyle/>
+                    <a:p>
+                      <a:endParaRPr lang="en-GB" sz="1600" dirty="0"/>
+                    </a:p>
+                  </a:txBody>
+                  <a:tcPr>
+                    <a:solidFill>
+                      <a:schemeClr val="accent4"/>
+                    </a:solidFill>
+                  </a:tcPr>
+                </a:tc>
+                <a:tc>
+                  <a:txBody>
+                    <a:bodyPr/>
+                    <a:lstStyle/>
+                    <a:p>
+                      <a:r>
+                        <a:rPr lang="en-GB" sz="1600" dirty="0"/>
+                        <a:t>In development</a:t>
+                      </a:r>
+                    </a:p>
+                  </a:txBody>
+                  <a:tcPr/>
+                </a:tc>
+                <a:extLst>
+                  <a:ext uri="{0D108BD9-81ED-4DB2-BD59-A6C34878D82A}">
+                    <a16:rowId xmlns:a16="http://schemas.microsoft.com/office/drawing/2014/main" val="661953748"/>
+                  </a:ext>
+                </a:extLst>
+              </a:tr>
+              <a:tr h="370840">
+                <a:tc>
+                  <a:txBody>
+                    <a:bodyPr/>
+                    <a:lstStyle/>
+                    <a:p>
+                      <a:r>
+                        <a:rPr lang="en-GB" sz="1600" dirty="0"/>
+                        <a:t>TT&amp;C</a:t>
+                      </a:r>
+                    </a:p>
+                  </a:txBody>
+                  <a:tcPr/>
+                </a:tc>
+                <a:tc>
+                  <a:txBody>
+                    <a:bodyPr/>
+                    <a:lstStyle/>
+                    <a:p>
+                      <a:endParaRPr lang="en-GB" sz="1600" dirty="0"/>
+                    </a:p>
+                  </a:txBody>
+                  <a:tcPr>
+                    <a:solidFill>
+                      <a:schemeClr val="accent4"/>
+                    </a:solidFill>
+                  </a:tcPr>
+                </a:tc>
+                <a:tc>
+                  <a:txBody>
+                    <a:bodyPr/>
+                    <a:lstStyle/>
+                    <a:p>
+                      <a:r>
+                        <a:rPr lang="en-GB" sz="1600" dirty="0"/>
+                        <a:t>New TOBC board to be ordered, tested</a:t>
+                      </a:r>
+                    </a:p>
+                  </a:txBody>
+                  <a:tcPr/>
+                </a:tc>
+                <a:tc>
+                  <a:txBody>
+                    <a:bodyPr/>
+                    <a:lstStyle/>
+                    <a:p>
+                      <a:endParaRPr lang="en-GB" sz="1600" dirty="0"/>
+                    </a:p>
+                  </a:txBody>
+                  <a:tcPr>
+                    <a:solidFill>
+                      <a:srgbClr val="C00000"/>
+                    </a:solidFill>
+                  </a:tcPr>
+                </a:tc>
+                <a:tc>
+                  <a:txBody>
+                    <a:bodyPr/>
+                    <a:lstStyle/>
+                    <a:p>
+                      <a:r>
+                        <a:rPr lang="en-GB" sz="1600" dirty="0"/>
+                        <a:t>Development not started</a:t>
+                      </a:r>
+                    </a:p>
+                  </a:txBody>
+                  <a:tcPr/>
+                </a:tc>
+                <a:extLst>
+                  <a:ext uri="{0D108BD9-81ED-4DB2-BD59-A6C34878D82A}">
+                    <a16:rowId xmlns:a16="http://schemas.microsoft.com/office/drawing/2014/main" val="517852655"/>
+                  </a:ext>
+                </a:extLst>
+              </a:tr>
+              <a:tr h="370840">
+                <a:tc>
+                  <a:txBody>
+                    <a:bodyPr/>
+                    <a:lstStyle/>
+                    <a:p>
+                      <a:r>
+                        <a:rPr lang="en-GB" sz="1600" dirty="0"/>
+                        <a:t>AOCS</a:t>
+                      </a:r>
+                    </a:p>
+                  </a:txBody>
+                  <a:tcPr/>
+                </a:tc>
+                <a:tc>
+                  <a:txBody>
+                    <a:bodyPr/>
+                    <a:lstStyle/>
+                    <a:p>
+                      <a:endParaRPr lang="en-GB" sz="1600" dirty="0"/>
+                    </a:p>
+                  </a:txBody>
+                  <a:tcPr>
+                    <a:solidFill>
+                      <a:schemeClr val="accent5"/>
+                    </a:solidFill>
+                  </a:tcPr>
+                </a:tc>
+                <a:tc>
+                  <a:txBody>
+                    <a:bodyPr/>
+                    <a:lstStyle/>
+                    <a:p>
+                      <a:r>
+                        <a:rPr lang="en-GB" sz="1600" dirty="0"/>
+                        <a:t>EQM models available</a:t>
+                      </a:r>
+                    </a:p>
+                  </a:txBody>
+                  <a:tcPr/>
+                </a:tc>
+                <a:tc>
+                  <a:txBody>
+                    <a:bodyPr/>
+                    <a:lstStyle/>
+                    <a:p>
+                      <a:endParaRPr lang="en-GB" sz="1600" dirty="0"/>
+                    </a:p>
+                  </a:txBody>
+                  <a:tcPr>
+                    <a:solidFill>
+                      <a:schemeClr val="accent4"/>
+                    </a:solidFill>
+                  </a:tcPr>
+                </a:tc>
+                <a:tc>
+                  <a:txBody>
+                    <a:bodyPr/>
+                    <a:lstStyle/>
+                    <a:p>
+                      <a:r>
+                        <a:rPr lang="en-GB" sz="1600" dirty="0"/>
+                        <a:t>Simulations written but not completely verified</a:t>
+                      </a:r>
+                    </a:p>
+                  </a:txBody>
+                  <a:tcPr/>
+                </a:tc>
+                <a:extLst>
+                  <a:ext uri="{0D108BD9-81ED-4DB2-BD59-A6C34878D82A}">
+                    <a16:rowId xmlns:a16="http://schemas.microsoft.com/office/drawing/2014/main" val="242956207"/>
+                  </a:ext>
+                </a:extLst>
+              </a:tr>
+            </a:tbl>
+          </a:graphicData>
+        </a:graphic>
+      </p:graphicFrame>
+    </p:spTree>
+    <p:extLst>
+      <p:ext uri="{BB962C8B-B14F-4D97-AF65-F5344CB8AC3E}">
+        <p14:creationId xmlns:p14="http://schemas.microsoft.com/office/powerpoint/2010/main" val="63406616"/>
+      </p:ext>
+    </p:extLst>
+  </p:cSld>
+  <p:clrMapOvr>
+    <a:masterClrMapping/>
+  </p:clrMapOvr>
+</p:sld>
+</file>
+
+<file path=ppt/slides/slide7.xml><?xml version="1.0" encoding="utf-8"?>
+<p:sld xmlns:a="http://schemas.openxmlformats.org/drawingml/2006/main" xmlns:r="http://schemas.openxmlformats.org/officeDocument/2006/relationships" xmlns:p="http://schemas.openxmlformats.org/presentationml/2006/main">
+  <p:cSld>
+    <p:spTree>
+      <p:nvGrpSpPr>
+        <p:cNvPr id="1" name=""/>
+        <p:cNvGrpSpPr/>
+        <p:nvPr/>
+      </p:nvGrpSpPr>
+      <p:grpSpPr>
+        <a:xfrm>
+          <a:off x="0" y="0"/>
+          <a:ext cx="0" cy="0"/>
+          <a:chOff x="0" y="0"/>
+          <a:chExt cx="0" cy="0"/>
+        </a:xfrm>
+      </p:grpSpPr>
+      <p:sp>
+        <p:nvSpPr>
+          <p:cNvPr id="2" name="Title 1">
+            <a:extLst>
+              <a:ext uri="{FF2B5EF4-FFF2-40B4-BE49-F238E27FC236}">
+                <a16:creationId xmlns:a16="http://schemas.microsoft.com/office/drawing/2014/main" id="{BD6A3833-FB2E-4163-B2C3-7D6F0ABD31DD}"/>
+              </a:ext>
+            </a:extLst>
+          </p:cNvPr>
+          <p:cNvSpPr>
+            <a:spLocks noGrp="1"/>
+          </p:cNvSpPr>
+          <p:nvPr>
+            <p:ph type="title"/>
+          </p:nvPr>
+        </p:nvSpPr>
+        <p:spPr/>
+        <p:txBody>
+          <a:bodyPr/>
+          <a:lstStyle/>
+          <a:p>
+            <a:r>
+              <a:rPr lang="en-GB" dirty="0"/>
+              <a:t>Hardware Stack</a:t>
+            </a:r>
+          </a:p>
+        </p:txBody>
+      </p:sp>
+      <p:sp>
+        <p:nvSpPr>
+          <p:cNvPr id="3" name="Content Placeholder 2">
+            <a:extLst>
+              <a:ext uri="{FF2B5EF4-FFF2-40B4-BE49-F238E27FC236}">
+                <a16:creationId xmlns:a16="http://schemas.microsoft.com/office/drawing/2014/main" id="{FC6F1481-E51C-43B4-A3B4-0B0F912013A8}"/>
+              </a:ext>
+            </a:extLst>
+          </p:cNvPr>
+          <p:cNvSpPr>
+            <a:spLocks noGrp="1"/>
+          </p:cNvSpPr>
+          <p:nvPr>
+            <p:ph idx="1"/>
+          </p:nvPr>
+        </p:nvSpPr>
+        <p:spPr>
+          <a:xfrm>
+            <a:off x="4597637" y="1825625"/>
+            <a:ext cx="6756162" cy="4351338"/>
+          </a:xfrm>
+        </p:spPr>
+        <p:txBody>
+          <a:bodyPr>
+            <a:noAutofit/>
+          </a:bodyPr>
+          <a:lstStyle/>
+          <a:p>
+            <a:r>
+              <a:rPr lang="en-GB" dirty="0"/>
+              <a:t>All printed circuit boards (PCBs) meet the PC104 standard</a:t>
+            </a:r>
+          </a:p>
+          <a:p>
+            <a:r>
+              <a:rPr lang="en-GB" dirty="0"/>
+              <a:t>Common PC104 bus connects all PCBs</a:t>
+            </a:r>
+          </a:p>
+          <a:p>
+            <a:r>
+              <a:rPr lang="en-GB" dirty="0"/>
+              <a:t>Power and data are contained on this bus</a:t>
+            </a:r>
+          </a:p>
+          <a:p>
+            <a:endParaRPr lang="en-GB" dirty="0"/>
+          </a:p>
+          <a:p>
+            <a:endParaRPr lang="en-GB" dirty="0"/>
+          </a:p>
+          <a:p>
+            <a:pPr marL="0" indent="0">
+              <a:buNone/>
+            </a:pPr>
+            <a:endParaRPr lang="en-GB" dirty="0"/>
+          </a:p>
+          <a:p>
+            <a:pPr marL="0" indent="0">
+              <a:buNone/>
+            </a:pPr>
+            <a:r>
+              <a:rPr lang="en-GB" sz="1800" i="1" dirty="0"/>
+              <a:t>Left: Engineering model (EM) telecommunications and onboard computer (TOBC) board, with PC104 header on the right</a:t>
+            </a:r>
+          </a:p>
+        </p:txBody>
+      </p:sp>
+      <p:sp>
+        <p:nvSpPr>
+          <p:cNvPr id="4" name="Footer Placeholder 3">
+            <a:extLst>
+              <a:ext uri="{FF2B5EF4-FFF2-40B4-BE49-F238E27FC236}">
+                <a16:creationId xmlns:a16="http://schemas.microsoft.com/office/drawing/2014/main" id="{35E88BE4-77E2-4247-8051-B6F4191A8195}"/>
+              </a:ext>
+            </a:extLst>
+          </p:cNvPr>
+          <p:cNvSpPr>
+            <a:spLocks noGrp="1"/>
+          </p:cNvSpPr>
+          <p:nvPr>
+            <p:ph type="ftr" sz="quarter" idx="11"/>
+          </p:nvPr>
+        </p:nvSpPr>
+        <p:spPr/>
+        <p:txBody>
+          <a:bodyPr/>
+          <a:lstStyle/>
+          <a:p>
+            <a:r>
+              <a:rPr lang="en-GB"/>
+              <a:t>SUSF – UoS3 Training Scheme</a:t>
+            </a:r>
+          </a:p>
+        </p:txBody>
+      </p:sp>
+      <p:sp>
+        <p:nvSpPr>
+          <p:cNvPr id="5" name="Slide Number Placeholder 4">
+            <a:extLst>
+              <a:ext uri="{FF2B5EF4-FFF2-40B4-BE49-F238E27FC236}">
+                <a16:creationId xmlns:a16="http://schemas.microsoft.com/office/drawing/2014/main" id="{66DCF095-0104-43B3-AE27-C285A2AFA555}"/>
+              </a:ext>
+            </a:extLst>
+          </p:cNvPr>
+          <p:cNvSpPr>
+            <a:spLocks noGrp="1"/>
+          </p:cNvSpPr>
+          <p:nvPr>
+            <p:ph type="sldNum" sz="quarter" idx="12"/>
+          </p:nvPr>
+        </p:nvSpPr>
+        <p:spPr/>
+        <p:txBody>
+          <a:bodyPr/>
+          <a:lstStyle/>
+          <a:p>
+            <a:fld id="{409D42ED-5227-461B-93AD-5F9E0026A866}" type="slidenum">
+              <a:rPr lang="en-GB" smtClean="0"/>
+              <a:t>7</a:t>
+            </a:fld>
+            <a:endParaRPr lang="en-GB"/>
+          </a:p>
+        </p:txBody>
+      </p:sp>
+      <p:pic>
+        <p:nvPicPr>
+          <p:cNvPr id="8" name="Picture 7" descr="A picture containing text, electronics, circuit&#10;&#10;Description automatically generated">
+            <a:extLst>
+              <a:ext uri="{FF2B5EF4-FFF2-40B4-BE49-F238E27FC236}">
+                <a16:creationId xmlns:a16="http://schemas.microsoft.com/office/drawing/2014/main" id="{A13372AC-7144-486C-B11B-C38E39E29057}"/>
+              </a:ext>
+            </a:extLst>
+          </p:cNvPr>
+          <p:cNvPicPr>
+            <a:picLocks noChangeAspect="1"/>
+          </p:cNvPicPr>
+          <p:nvPr/>
+        </p:nvPicPr>
+        <p:blipFill rotWithShape="1">
+          <a:blip r:embed="rId2">
+            <a:extLst>
+              <a:ext uri="{28A0092B-C50C-407E-A947-70E740481C1C}">
+                <a14:useLocalDpi xmlns:a14="http://schemas.microsoft.com/office/drawing/2010/main" val="0"/>
+              </a:ext>
+            </a:extLst>
+          </a:blip>
+          <a:srcRect l="5070" t="35638" r="8173" b="4174"/>
+          <a:stretch/>
+        </p:blipFill>
+        <p:spPr>
+          <a:xfrm>
+            <a:off x="0" y="1690688"/>
+            <a:ext cx="4460906" cy="4127620"/>
+          </a:xfrm>
+          <a:prstGeom prst="rect">
+            <a:avLst/>
+          </a:prstGeom>
+        </p:spPr>
+      </p:pic>
+      <p:cxnSp>
+        <p:nvCxnSpPr>
+          <p:cNvPr id="10" name="Straight Arrow Connector 9">
+            <a:extLst>
+              <a:ext uri="{FF2B5EF4-FFF2-40B4-BE49-F238E27FC236}">
+                <a16:creationId xmlns:a16="http://schemas.microsoft.com/office/drawing/2014/main" id="{83D1EA7C-5938-4F97-8818-6B38613679A8}"/>
+              </a:ext>
+            </a:extLst>
+          </p:cNvPr>
+          <p:cNvCxnSpPr>
+            <a:cxnSpLocks/>
+          </p:cNvCxnSpPr>
+          <p:nvPr/>
+        </p:nvCxnSpPr>
+        <p:spPr>
+          <a:xfrm flipH="1">
+            <a:off x="4247261" y="2938463"/>
+            <a:ext cx="462852" cy="69657"/>
+          </a:xfrm>
+          <a:prstGeom prst="straightConnector1">
+            <a:avLst/>
+          </a:prstGeom>
+          <a:ln>
+            <a:tailEnd type="triangle"/>
+          </a:ln>
+        </p:spPr>
+        <p:style>
+          <a:lnRef idx="3">
+            <a:schemeClr val="accent5"/>
+          </a:lnRef>
+          <a:fillRef idx="0">
+            <a:schemeClr val="accent5"/>
+          </a:fillRef>
+          <a:effectRef idx="2">
+            <a:schemeClr val="accent5"/>
+          </a:effectRef>
+          <a:fontRef idx="minor">
+            <a:schemeClr val="tx1"/>
+          </a:fontRef>
+        </p:style>
+      </p:cxnSp>
+    </p:spTree>
+    <p:extLst>
+      <p:ext uri="{BB962C8B-B14F-4D97-AF65-F5344CB8AC3E}">
+        <p14:creationId xmlns:p14="http://schemas.microsoft.com/office/powerpoint/2010/main" val="2053193411"/>
       </p:ext>
     </p:extLst>
   </p:cSld>

</xml_diff>

<commit_message>
Updates to system overview doc
</commit_message>
<xml_diff>
--- a/platform/UTS_SystemOverview.pptx
+++ b/platform/UTS_SystemOverview.pptx
@@ -4734,8 +4734,8 @@
         </p:nvSpPr>
         <p:spPr>
           <a:xfrm>
-            <a:off x="3666146" y="1825625"/>
-            <a:ext cx="7687654" cy="4351338"/>
+            <a:off x="4038600" y="1825625"/>
+            <a:ext cx="7315200" cy="4351338"/>
           </a:xfrm>
         </p:spPr>
         <p:txBody>
@@ -5828,7 +5828,7 @@
           <a:p>
             <a:r>
               <a:rPr lang="en-GB" dirty="0"/>
-              <a:t>Hardware Stack</a:t>
+              <a:t>Circuit Boards</a:t>
             </a:r>
           </a:p>
         </p:txBody>

</xml_diff>

<commit_message>
Updates to system overview
</commit_message>
<xml_diff>
--- a/platform/UTS_SystemOverview.pptx
+++ b/platform/UTS_SystemOverview.pptx
@@ -5,16 +5,22 @@
     <p:sldMasterId id="2147483660" r:id="rId1"/>
   </p:sldMasterIdLst>
   <p:notesMasterIdLst>
-    <p:notesMasterId r:id="rId9"/>
+    <p:notesMasterId r:id="rId15"/>
   </p:notesMasterIdLst>
   <p:sldIdLst>
     <p:sldId id="256" r:id="rId2"/>
     <p:sldId id="258" r:id="rId3"/>
     <p:sldId id="257" r:id="rId4"/>
     <p:sldId id="262" r:id="rId5"/>
-    <p:sldId id="261" r:id="rId6"/>
-    <p:sldId id="259" r:id="rId7"/>
-    <p:sldId id="260" r:id="rId8"/>
+    <p:sldId id="263" r:id="rId6"/>
+    <p:sldId id="261" r:id="rId7"/>
+    <p:sldId id="259" r:id="rId8"/>
+    <p:sldId id="264" r:id="rId9"/>
+    <p:sldId id="260" r:id="rId10"/>
+    <p:sldId id="266" r:id="rId11"/>
+    <p:sldId id="265" r:id="rId12"/>
+    <p:sldId id="267" r:id="rId13"/>
+    <p:sldId id="268" r:id="rId14"/>
   </p:sldIdLst>
   <p:sldSz cx="12192000" cy="6858000"/>
   <p:notesSz cx="6858000" cy="9144000"/>
@@ -121,6 +127,166 @@
 </p:presentation>
 </file>
 
+<file path=ppt/revisionInfo.xml><?xml version="1.0" encoding="utf-8"?>
+<p1510:revInfo xmlns:a="http://schemas.openxmlformats.org/drawingml/2006/main" xmlns:r="http://schemas.openxmlformats.org/officeDocument/2006/relationships" xmlns:p1510="http://schemas.microsoft.com/office/powerpoint/2015/10/main">
+  <p1510:revLst>
+    <p1510:client id="{779D95B1-DD83-4EC7-A87B-85275740A602}" v="3534" dt="2021-09-15T09:30:54.026"/>
+  </p1510:revLst>
+</p1510:revInfo>
+</file>
+
+<file path=ppt/changesInfos/changesInfo1.xml><?xml version="1.0" encoding="utf-8"?>
+<pc:chgInfo xmlns:a="http://schemas.openxmlformats.org/drawingml/2006/main" xmlns:r="http://schemas.openxmlformats.org/officeDocument/2006/relationships" xmlns:ac="http://schemas.microsoft.com/office/drawing/2013/main/command" xmlns:pc="http://schemas.microsoft.com/office/powerpoint/2013/main/command">
+  <pc:docChgLst>
+    <pc:chgData name="Duncan Hamill (dh2g16)" userId="S::dh2g16@soton.ac.uk::c4621985-953c-4e7b-8d56-8ff6722da9ff" providerId="AD" clId="Web-{779D95B1-DD83-4EC7-A87B-85275740A602}"/>
+    <pc:docChg chg="addSld modSld">
+      <pc:chgData name="Duncan Hamill (dh2g16)" userId="S::dh2g16@soton.ac.uk::c4621985-953c-4e7b-8d56-8ff6722da9ff" providerId="AD" clId="Web-{779D95B1-DD83-4EC7-A87B-85275740A602}" dt="2021-09-15T09:30:51.588" v="1689" actId="20577"/>
+      <pc:docMkLst>
+        <pc:docMk/>
+      </pc:docMkLst>
+      <pc:sldChg chg="modSp new">
+        <pc:chgData name="Duncan Hamill (dh2g16)" userId="S::dh2g16@soton.ac.uk::c4621985-953c-4e7b-8d56-8ff6722da9ff" providerId="AD" clId="Web-{779D95B1-DD83-4EC7-A87B-85275740A602}" dt="2021-09-15T09:02:36.731" v="239" actId="20577"/>
+        <pc:sldMkLst>
+          <pc:docMk/>
+          <pc:sldMk cId="3740144343" sldId="263"/>
+        </pc:sldMkLst>
+        <pc:spChg chg="mod">
+          <ac:chgData name="Duncan Hamill (dh2g16)" userId="S::dh2g16@soton.ac.uk::c4621985-953c-4e7b-8d56-8ff6722da9ff" providerId="AD" clId="Web-{779D95B1-DD83-4EC7-A87B-85275740A602}" dt="2021-09-15T08:59:46.243" v="1" actId="20577"/>
+          <ac:spMkLst>
+            <pc:docMk/>
+            <pc:sldMk cId="3740144343" sldId="263"/>
+            <ac:spMk id="2" creationId="{9C26A3F8-8EF0-41F0-91D6-30FD90C6AE1B}"/>
+          </ac:spMkLst>
+        </pc:spChg>
+        <pc:spChg chg="mod">
+          <ac:chgData name="Duncan Hamill (dh2g16)" userId="S::dh2g16@soton.ac.uk::c4621985-953c-4e7b-8d56-8ff6722da9ff" providerId="AD" clId="Web-{779D95B1-DD83-4EC7-A87B-85275740A602}" dt="2021-09-15T09:02:36.731" v="239" actId="20577"/>
+          <ac:spMkLst>
+            <pc:docMk/>
+            <pc:sldMk cId="3740144343" sldId="263"/>
+            <ac:spMk id="3" creationId="{A76B4921-E9C4-4DE5-872C-4CE736BE42FD}"/>
+          </ac:spMkLst>
+        </pc:spChg>
+      </pc:sldChg>
+      <pc:sldChg chg="modSp new">
+        <pc:chgData name="Duncan Hamill (dh2g16)" userId="S::dh2g16@soton.ac.uk::c4621985-953c-4e7b-8d56-8ff6722da9ff" providerId="AD" clId="Web-{779D95B1-DD83-4EC7-A87B-85275740A602}" dt="2021-09-15T09:08:47.658" v="679" actId="20577"/>
+        <pc:sldMkLst>
+          <pc:docMk/>
+          <pc:sldMk cId="1491277749" sldId="264"/>
+        </pc:sldMkLst>
+        <pc:spChg chg="mod">
+          <ac:chgData name="Duncan Hamill (dh2g16)" userId="S::dh2g16@soton.ac.uk::c4621985-953c-4e7b-8d56-8ff6722da9ff" providerId="AD" clId="Web-{779D95B1-DD83-4EC7-A87B-85275740A602}" dt="2021-09-15T09:03:38.201" v="250" actId="20577"/>
+          <ac:spMkLst>
+            <pc:docMk/>
+            <pc:sldMk cId="1491277749" sldId="264"/>
+            <ac:spMk id="2" creationId="{707F4634-3CE6-4699-8B4E-49C6FB7755D1}"/>
+          </ac:spMkLst>
+        </pc:spChg>
+        <pc:spChg chg="mod">
+          <ac:chgData name="Duncan Hamill (dh2g16)" userId="S::dh2g16@soton.ac.uk::c4621985-953c-4e7b-8d56-8ff6722da9ff" providerId="AD" clId="Web-{779D95B1-DD83-4EC7-A87B-85275740A602}" dt="2021-09-15T09:08:47.658" v="679" actId="20577"/>
+          <ac:spMkLst>
+            <pc:docMk/>
+            <pc:sldMk cId="1491277749" sldId="264"/>
+            <ac:spMk id="3" creationId="{BBF8E816-19FB-464B-A30F-484DE488A81B}"/>
+          </ac:spMkLst>
+        </pc:spChg>
+      </pc:sldChg>
+      <pc:sldChg chg="modSp new">
+        <pc:chgData name="Duncan Hamill (dh2g16)" userId="S::dh2g16@soton.ac.uk::c4621985-953c-4e7b-8d56-8ff6722da9ff" providerId="AD" clId="Web-{779D95B1-DD83-4EC7-A87B-85275740A602}" dt="2021-09-15T09:16:53.152" v="973" actId="20577"/>
+        <pc:sldMkLst>
+          <pc:docMk/>
+          <pc:sldMk cId="2474391567" sldId="265"/>
+        </pc:sldMkLst>
+        <pc:spChg chg="mod">
+          <ac:chgData name="Duncan Hamill (dh2g16)" userId="S::dh2g16@soton.ac.uk::c4621985-953c-4e7b-8d56-8ff6722da9ff" providerId="AD" clId="Web-{779D95B1-DD83-4EC7-A87B-85275740A602}" dt="2021-09-15T09:09:09.393" v="689" actId="20577"/>
+          <ac:spMkLst>
+            <pc:docMk/>
+            <pc:sldMk cId="2474391567" sldId="265"/>
+            <ac:spMk id="2" creationId="{9F5AD2DB-21B5-4C5B-9D66-7D2E872FEE41}"/>
+          </ac:spMkLst>
+        </pc:spChg>
+        <pc:spChg chg="mod">
+          <ac:chgData name="Duncan Hamill (dh2g16)" userId="S::dh2g16@soton.ac.uk::c4621985-953c-4e7b-8d56-8ff6722da9ff" providerId="AD" clId="Web-{779D95B1-DD83-4EC7-A87B-85275740A602}" dt="2021-09-15T09:16:53.152" v="973" actId="20577"/>
+          <ac:spMkLst>
+            <pc:docMk/>
+            <pc:sldMk cId="2474391567" sldId="265"/>
+            <ac:spMk id="3" creationId="{16FE3C49-8ABF-43A6-B3B3-9DC2D457A414}"/>
+          </ac:spMkLst>
+        </pc:spChg>
+      </pc:sldChg>
+      <pc:sldChg chg="modSp new">
+        <pc:chgData name="Duncan Hamill (dh2g16)" userId="S::dh2g16@soton.ac.uk::c4621985-953c-4e7b-8d56-8ff6722da9ff" providerId="AD" clId="Web-{779D95B1-DD83-4EC7-A87B-85275740A602}" dt="2021-09-15T09:22:05.279" v="1179" actId="20577"/>
+        <pc:sldMkLst>
+          <pc:docMk/>
+          <pc:sldMk cId="938831069" sldId="266"/>
+        </pc:sldMkLst>
+        <pc:spChg chg="mod">
+          <ac:chgData name="Duncan Hamill (dh2g16)" userId="S::dh2g16@soton.ac.uk::c4621985-953c-4e7b-8d56-8ff6722da9ff" providerId="AD" clId="Web-{779D95B1-DD83-4EC7-A87B-85275740A602}" dt="2021-09-15T09:17:12.435" v="982" actId="20577"/>
+          <ac:spMkLst>
+            <pc:docMk/>
+            <pc:sldMk cId="938831069" sldId="266"/>
+            <ac:spMk id="2" creationId="{B05BD29B-3DA6-4349-8BDC-B8674B790C3F}"/>
+          </ac:spMkLst>
+        </pc:spChg>
+        <pc:spChg chg="mod">
+          <ac:chgData name="Duncan Hamill (dh2g16)" userId="S::dh2g16@soton.ac.uk::c4621985-953c-4e7b-8d56-8ff6722da9ff" providerId="AD" clId="Web-{779D95B1-DD83-4EC7-A87B-85275740A602}" dt="2021-09-15T09:22:05.279" v="1179" actId="20577"/>
+          <ac:spMkLst>
+            <pc:docMk/>
+            <pc:sldMk cId="938831069" sldId="266"/>
+            <ac:spMk id="3" creationId="{14976112-3D0F-4450-9F27-938E24621DE9}"/>
+          </ac:spMkLst>
+        </pc:spChg>
+      </pc:sldChg>
+      <pc:sldChg chg="modSp new">
+        <pc:chgData name="Duncan Hamill (dh2g16)" userId="S::dh2g16@soton.ac.uk::c4621985-953c-4e7b-8d56-8ff6722da9ff" providerId="AD" clId="Web-{779D95B1-DD83-4EC7-A87B-85275740A602}" dt="2021-09-15T09:24:27.505" v="1412" actId="20577"/>
+        <pc:sldMkLst>
+          <pc:docMk/>
+          <pc:sldMk cId="2136263655" sldId="267"/>
+        </pc:sldMkLst>
+        <pc:spChg chg="mod">
+          <ac:chgData name="Duncan Hamill (dh2g16)" userId="S::dh2g16@soton.ac.uk::c4621985-953c-4e7b-8d56-8ff6722da9ff" providerId="AD" clId="Web-{779D95B1-DD83-4EC7-A87B-85275740A602}" dt="2021-09-15T09:22:17.717" v="1187" actId="20577"/>
+          <ac:spMkLst>
+            <pc:docMk/>
+            <pc:sldMk cId="2136263655" sldId="267"/>
+            <ac:spMk id="2" creationId="{E19A0EF2-C267-4AFB-A9F3-64EE4CF1871C}"/>
+          </ac:spMkLst>
+        </pc:spChg>
+        <pc:spChg chg="mod">
+          <ac:chgData name="Duncan Hamill (dh2g16)" userId="S::dh2g16@soton.ac.uk::c4621985-953c-4e7b-8d56-8ff6722da9ff" providerId="AD" clId="Web-{779D95B1-DD83-4EC7-A87B-85275740A602}" dt="2021-09-15T09:24:27.505" v="1412" actId="20577"/>
+          <ac:spMkLst>
+            <pc:docMk/>
+            <pc:sldMk cId="2136263655" sldId="267"/>
+            <ac:spMk id="3" creationId="{95AC78F8-4309-4071-832C-AE425CCAE46C}"/>
+          </ac:spMkLst>
+        </pc:spChg>
+      </pc:sldChg>
+      <pc:sldChg chg="modSp new">
+        <pc:chgData name="Duncan Hamill (dh2g16)" userId="S::dh2g16@soton.ac.uk::c4621985-953c-4e7b-8d56-8ff6722da9ff" providerId="AD" clId="Web-{779D95B1-DD83-4EC7-A87B-85275740A602}" dt="2021-09-15T09:30:51.588" v="1689" actId="20577"/>
+        <pc:sldMkLst>
+          <pc:docMk/>
+          <pc:sldMk cId="3660392004" sldId="268"/>
+        </pc:sldMkLst>
+        <pc:spChg chg="mod">
+          <ac:chgData name="Duncan Hamill (dh2g16)" userId="S::dh2g16@soton.ac.uk::c4621985-953c-4e7b-8d56-8ff6722da9ff" providerId="AD" clId="Web-{779D95B1-DD83-4EC7-A87B-85275740A602}" dt="2021-09-15T09:25:05.570" v="1432" actId="20577"/>
+          <ac:spMkLst>
+            <pc:docMk/>
+            <pc:sldMk cId="3660392004" sldId="268"/>
+            <ac:spMk id="2" creationId="{0D96DABB-7395-4455-BACF-38A36527E060}"/>
+          </ac:spMkLst>
+        </pc:spChg>
+        <pc:spChg chg="mod">
+          <ac:chgData name="Duncan Hamill (dh2g16)" userId="S::dh2g16@soton.ac.uk::c4621985-953c-4e7b-8d56-8ff6722da9ff" providerId="AD" clId="Web-{779D95B1-DD83-4EC7-A87B-85275740A602}" dt="2021-09-15T09:30:51.588" v="1689" actId="20577"/>
+          <ac:spMkLst>
+            <pc:docMk/>
+            <pc:sldMk cId="3660392004" sldId="268"/>
+            <ac:spMk id="3" creationId="{D4AC85E3-8E37-4B14-A642-E502BBC21591}"/>
+          </ac:spMkLst>
+        </pc:spChg>
+      </pc:sldChg>
+    </pc:docChg>
+  </pc:docChgLst>
+</pc:chgInfo>
+</file>
+
 <file path=ppt/notesMasters/notesMaster1.xml><?xml version="1.0" encoding="utf-8"?>
 <p:notesMaster xmlns:a="http://schemas.openxmlformats.org/drawingml/2006/main" xmlns:r="http://schemas.openxmlformats.org/officeDocument/2006/relationships" xmlns:p="http://schemas.openxmlformats.org/presentationml/2006/main">
   <p:cSld>
@@ -203,7 +369,7 @@
           <a:p>
             <a:fld id="{B3B94081-C4A3-44FE-BD72-BE546CAF8935}" type="datetimeFigureOut">
               <a:rPr lang="en-GB" smtClean="0"/>
-              <a:t>14/09/2021</a:t>
+              <a:t>15/09/2021</a:t>
             </a:fld>
             <a:endParaRPr lang="en-GB"/>
           </a:p>
@@ -626,7 +792,7 @@
           <a:p>
             <a:fld id="{19DB0E3A-21DB-4FD7-A3B7-B0158D19ED14}" type="datetime1">
               <a:rPr lang="en-GB" smtClean="0"/>
-              <a:t>14/09/2021</a:t>
+              <a:t>15/09/2021</a:t>
             </a:fld>
             <a:endParaRPr lang="en-GB"/>
           </a:p>
@@ -830,7 +996,7 @@
           <a:p>
             <a:fld id="{A90BECFA-D09E-4452-AC0B-2BFA5F8B588A}" type="datetime1">
               <a:rPr lang="en-GB" smtClean="0"/>
-              <a:t>14/09/2021</a:t>
+              <a:t>15/09/2021</a:t>
             </a:fld>
             <a:endParaRPr lang="en-GB"/>
           </a:p>
@@ -1043,7 +1209,7 @@
           <a:p>
             <a:fld id="{FBDF0139-47DC-4255-B867-4558F1EC3EC1}" type="datetime1">
               <a:rPr lang="en-GB" smtClean="0"/>
-              <a:t>14/09/2021</a:t>
+              <a:t>15/09/2021</a:t>
             </a:fld>
             <a:endParaRPr lang="en-GB"/>
           </a:p>
@@ -1246,7 +1412,7 @@
           <a:p>
             <a:fld id="{2CEFAB21-F00B-4CEB-BF38-C9F4F8AC8966}" type="datetime1">
               <a:rPr lang="en-GB" smtClean="0"/>
-              <a:t>14/09/2021</a:t>
+              <a:t>15/09/2021</a:t>
             </a:fld>
             <a:endParaRPr lang="en-GB"/>
           </a:p>
@@ -1521,7 +1687,7 @@
           <a:p>
             <a:fld id="{EC37ADDD-5A61-41F7-85AD-8DA16BAE4289}" type="datetime1">
               <a:rPr lang="en-GB" smtClean="0"/>
-              <a:t>14/09/2021</a:t>
+              <a:t>15/09/2021</a:t>
             </a:fld>
             <a:endParaRPr lang="en-GB"/>
           </a:p>
@@ -1855,7 +2021,7 @@
           <a:p>
             <a:fld id="{64638756-75D3-4B12-93AC-2C092CF2B78C}" type="datetime1">
               <a:rPr lang="en-GB" smtClean="0"/>
-              <a:t>14/09/2021</a:t>
+              <a:t>15/09/2021</a:t>
             </a:fld>
             <a:endParaRPr lang="en-GB"/>
           </a:p>
@@ -2273,7 +2439,7 @@
           <a:p>
             <a:fld id="{E7B9996B-0B0C-4B1A-B300-46F205F00364}" type="datetime1">
               <a:rPr lang="en-GB" smtClean="0"/>
-              <a:t>14/09/2021</a:t>
+              <a:t>15/09/2021</a:t>
             </a:fld>
             <a:endParaRPr lang="en-GB"/>
           </a:p>
@@ -2418,7 +2584,7 @@
           <a:p>
             <a:fld id="{99F34203-DAFB-4929-A64E-04F404087269}" type="datetime1">
               <a:rPr lang="en-GB" smtClean="0"/>
-              <a:t>14/09/2021</a:t>
+              <a:t>15/09/2021</a:t>
             </a:fld>
             <a:endParaRPr lang="en-GB"/>
           </a:p>
@@ -2534,7 +2700,7 @@
           <a:p>
             <a:fld id="{92C9D7EC-7D67-4AD5-A9A2-D52BD6D60EB7}" type="datetime1">
               <a:rPr lang="en-GB" smtClean="0"/>
-              <a:t>14/09/2021</a:t>
+              <a:t>15/09/2021</a:t>
             </a:fld>
             <a:endParaRPr lang="en-GB"/>
           </a:p>
@@ -2850,7 +3016,7 @@
           <a:p>
             <a:fld id="{80D6F779-D514-4A85-ACDC-97ABE9B1BC03}" type="datetime1">
               <a:rPr lang="en-GB" smtClean="0"/>
-              <a:t>14/09/2021</a:t>
+              <a:t>15/09/2021</a:t>
             </a:fld>
             <a:endParaRPr lang="en-GB"/>
           </a:p>
@@ -3146,7 +3312,7 @@
           <a:p>
             <a:fld id="{07BE60F1-9E53-48CC-91C8-A0FDC2C506A4}" type="datetime1">
               <a:rPr lang="en-GB" smtClean="0"/>
-              <a:t>14/09/2021</a:t>
+              <a:t>15/09/2021</a:t>
             </a:fld>
             <a:endParaRPr lang="en-GB"/>
           </a:p>
@@ -3392,7 +3558,7 @@
           <a:p>
             <a:fld id="{48E57B69-0FD3-427C-A2AF-D1895BA90C78}" type="datetime1">
               <a:rPr lang="en-GB" smtClean="0"/>
-              <a:t>14/09/2021</a:t>
+              <a:t>15/09/2021</a:t>
             </a:fld>
             <a:endParaRPr lang="en-GB"/>
           </a:p>
@@ -4031,6 +4197,1030 @@
 </p:sld>
 </file>
 
+<file path=ppt/slides/slide10.xml><?xml version="1.0" encoding="utf-8"?>
+<p:sld xmlns:a="http://schemas.openxmlformats.org/drawingml/2006/main" xmlns:r="http://schemas.openxmlformats.org/officeDocument/2006/relationships" xmlns:p="http://schemas.openxmlformats.org/presentationml/2006/main">
+  <p:cSld>
+    <p:spTree>
+      <p:nvGrpSpPr>
+        <p:cNvPr id="1" name=""/>
+        <p:cNvGrpSpPr/>
+        <p:nvPr/>
+      </p:nvGrpSpPr>
+      <p:grpSpPr>
+        <a:xfrm>
+          <a:off x="0" y="0"/>
+          <a:ext cx="0" cy="0"/>
+          <a:chOff x="0" y="0"/>
+          <a:chExt cx="0" cy="0"/>
+        </a:xfrm>
+      </p:grpSpPr>
+      <p:sp>
+        <p:nvSpPr>
+          <p:cNvPr id="2" name="Title 1">
+            <a:extLst>
+              <a:ext uri="{FF2B5EF4-FFF2-40B4-BE49-F238E27FC236}">
+                <a16:creationId xmlns:a16="http://schemas.microsoft.com/office/drawing/2014/main" id="{B05BD29B-3DA6-4349-8BDC-B8674B790C3F}"/>
+              </a:ext>
+            </a:extLst>
+          </p:cNvPr>
+          <p:cNvSpPr>
+            <a:spLocks noGrp="1"/>
+          </p:cNvSpPr>
+          <p:nvPr>
+            <p:ph type="title"/>
+          </p:nvPr>
+        </p:nvSpPr>
+        <p:spPr/>
+        <p:txBody>
+          <a:bodyPr/>
+          <a:lstStyle/>
+          <a:p>
+            <a:r>
+              <a:rPr lang="en-GB" dirty="0">
+                <a:latin typeface="Bahnschrift SemiBold Condensed"/>
+              </a:rPr>
+              <a:t>Electronics Tooling</a:t>
+            </a:r>
+            <a:endParaRPr lang="en-GB" dirty="0"/>
+          </a:p>
+        </p:txBody>
+      </p:sp>
+      <p:sp>
+        <p:nvSpPr>
+          <p:cNvPr id="3" name="Content Placeholder 2">
+            <a:extLst>
+              <a:ext uri="{FF2B5EF4-FFF2-40B4-BE49-F238E27FC236}">
+                <a16:creationId xmlns:a16="http://schemas.microsoft.com/office/drawing/2014/main" id="{14976112-3D0F-4450-9F27-938E24621DE9}"/>
+              </a:ext>
+            </a:extLst>
+          </p:cNvPr>
+          <p:cNvSpPr>
+            <a:spLocks noGrp="1"/>
+          </p:cNvSpPr>
+          <p:nvPr>
+            <p:ph idx="1"/>
+          </p:nvPr>
+        </p:nvSpPr>
+        <p:spPr/>
+        <p:txBody>
+          <a:bodyPr vert="horz" lIns="91440" tIns="45720" rIns="91440" bIns="45720" rtlCol="0" anchor="t">
+            <a:normAutofit lnSpcReduction="10000"/>
+          </a:bodyPr>
+          <a:lstStyle/>
+          <a:p>
+            <a:r>
+              <a:rPr lang="en-GB" dirty="0">
+                <a:cs typeface="Calibri"/>
+              </a:rPr>
+              <a:t>All circuit board designs in Eagle</a:t>
+            </a:r>
+          </a:p>
+          <a:p>
+            <a:r>
+              <a:rPr lang="en-GB" dirty="0">
+                <a:cs typeface="Calibri"/>
+              </a:rPr>
+              <a:t>Latest EPS is v3.2 on </a:t>
+            </a:r>
+            <a:r>
+              <a:rPr lang="en-GB" dirty="0" err="1">
+                <a:cs typeface="Calibri"/>
+              </a:rPr>
+              <a:t>sharepoint</a:t>
+            </a:r>
+            <a:r>
+              <a:rPr lang="en-GB" dirty="0">
+                <a:cs typeface="Calibri"/>
+              </a:rPr>
+              <a:t>:</a:t>
+            </a:r>
+            <a:r>
+              <a:rPr lang="en-GB" dirty="0">
+                <a:ea typeface="+mn-lt"/>
+                <a:cs typeface="+mn-lt"/>
+              </a:rPr>
+              <a:t> </a:t>
+            </a:r>
+          </a:p>
+          <a:p>
+            <a:pPr marL="457200" lvl="1" indent="0">
+              <a:buNone/>
+            </a:pPr>
+            <a:r>
+              <a:rPr lang="en-GB" sz="1400" dirty="0">
+                <a:ea typeface="+mn-lt"/>
+                <a:cs typeface="+mn-lt"/>
+                <a:hlinkClick r:id="rId2"/>
+              </a:rPr>
+              <a:t>https://sotonac.sharepoint.com/:f:/r/teams/UniversityofSouthamptonSmallSatelliteUoS3/FEE%20GDP%20202021/EPS/Power_Boardv3.2_270321?csf=1&amp;web=1&amp;e=u4JDre</a:t>
+            </a:r>
+            <a:endParaRPr lang="en-GB" sz="1400">
+              <a:cs typeface="Calibri"/>
+            </a:endParaRPr>
+          </a:p>
+          <a:p>
+            <a:r>
+              <a:rPr lang="en-GB" dirty="0">
+                <a:ea typeface="+mn-lt"/>
+                <a:cs typeface="+mn-lt"/>
+              </a:rPr>
+              <a:t>Lates TOBC is v1.5 on </a:t>
+            </a:r>
+            <a:r>
+              <a:rPr lang="en-GB" dirty="0" err="1">
+                <a:ea typeface="+mn-lt"/>
+                <a:cs typeface="+mn-lt"/>
+              </a:rPr>
+              <a:t>sharepoint</a:t>
+            </a:r>
+            <a:r>
+              <a:rPr lang="en-GB" dirty="0">
+                <a:ea typeface="+mn-lt"/>
+                <a:cs typeface="+mn-lt"/>
+              </a:rPr>
+              <a:t>:</a:t>
+            </a:r>
+            <a:endParaRPr lang="en-GB" sz="1800" dirty="0">
+              <a:ea typeface="+mn-lt"/>
+              <a:cs typeface="+mn-lt"/>
+            </a:endParaRPr>
+          </a:p>
+          <a:p>
+            <a:pPr marL="457200" lvl="1" indent="0">
+              <a:buNone/>
+            </a:pPr>
+            <a:r>
+              <a:rPr lang="en-GB" sz="1300" dirty="0">
+                <a:ea typeface="+mn-lt"/>
+                <a:cs typeface="+mn-lt"/>
+                <a:hlinkClick r:id="rId2"/>
+              </a:rPr>
+              <a:t>https://sotonac.sharepoint.com/:f:/r/teams/UniversityofSouthamptonSmallSatelliteUoS3/FEE%20GDP%20202021/EPS/Power_Boardv3.2_270321?csf=1&amp;web=1&amp;e=u4JDre</a:t>
+            </a:r>
+            <a:r>
+              <a:rPr lang="en-GB" sz="1300" dirty="0">
+                <a:ea typeface="+mn-lt"/>
+                <a:cs typeface="+mn-lt"/>
+              </a:rPr>
+              <a:t> </a:t>
+            </a:r>
+            <a:endParaRPr lang="en-GB" sz="1300"/>
+          </a:p>
+          <a:p>
+            <a:endParaRPr lang="en-GB" sz="1800" dirty="0">
+              <a:ea typeface="+mn-lt"/>
+              <a:cs typeface="+mn-lt"/>
+            </a:endParaRPr>
+          </a:p>
+          <a:p>
+            <a:r>
+              <a:rPr lang="en-GB" dirty="0">
+                <a:ea typeface="+mn-lt"/>
+                <a:cs typeface="+mn-lt"/>
+              </a:rPr>
+              <a:t>Propulsion lab (current CubeSat home) has power supplies, soldering iron, etc.</a:t>
+            </a:r>
+          </a:p>
+          <a:p>
+            <a:r>
+              <a:rPr lang="en-GB" dirty="0">
+                <a:ea typeface="+mn-lt"/>
+                <a:cs typeface="+mn-lt"/>
+              </a:rPr>
+              <a:t>Technicians in electronics lab B13 introduced to TOBC board this year and helped with debugging</a:t>
+            </a:r>
+            <a:endParaRPr lang="en-GB"/>
+          </a:p>
+        </p:txBody>
+      </p:sp>
+      <p:sp>
+        <p:nvSpPr>
+          <p:cNvPr id="4" name="Footer Placeholder 3">
+            <a:extLst>
+              <a:ext uri="{FF2B5EF4-FFF2-40B4-BE49-F238E27FC236}">
+                <a16:creationId xmlns:a16="http://schemas.microsoft.com/office/drawing/2014/main" id="{4C8E2190-3268-4187-B698-72E161403D32}"/>
+              </a:ext>
+            </a:extLst>
+          </p:cNvPr>
+          <p:cNvSpPr>
+            <a:spLocks noGrp="1"/>
+          </p:cNvSpPr>
+          <p:nvPr>
+            <p:ph type="ftr" sz="quarter" idx="11"/>
+          </p:nvPr>
+        </p:nvSpPr>
+        <p:spPr/>
+        <p:txBody>
+          <a:bodyPr/>
+          <a:lstStyle/>
+          <a:p>
+            <a:r>
+              <a:rPr lang="en-GB"/>
+              <a:t>SUSF – UoS3 Training Scheme</a:t>
+            </a:r>
+          </a:p>
+        </p:txBody>
+      </p:sp>
+      <p:sp>
+        <p:nvSpPr>
+          <p:cNvPr id="5" name="Slide Number Placeholder 4">
+            <a:extLst>
+              <a:ext uri="{FF2B5EF4-FFF2-40B4-BE49-F238E27FC236}">
+                <a16:creationId xmlns:a16="http://schemas.microsoft.com/office/drawing/2014/main" id="{32B1BDC8-7718-4325-9F83-3FB28BD773D0}"/>
+              </a:ext>
+            </a:extLst>
+          </p:cNvPr>
+          <p:cNvSpPr>
+            <a:spLocks noGrp="1"/>
+          </p:cNvSpPr>
+          <p:nvPr>
+            <p:ph type="sldNum" sz="quarter" idx="12"/>
+          </p:nvPr>
+        </p:nvSpPr>
+        <p:spPr/>
+        <p:txBody>
+          <a:bodyPr/>
+          <a:lstStyle/>
+          <a:p>
+            <a:fld id="{409D42ED-5227-461B-93AD-5F9E0026A866}" type="slidenum">
+              <a:rPr lang="en-GB" smtClean="0"/>
+              <a:t>10</a:t>
+            </a:fld>
+            <a:endParaRPr lang="en-GB"/>
+          </a:p>
+        </p:txBody>
+      </p:sp>
+    </p:spTree>
+    <p:extLst>
+      <p:ext uri="{BB962C8B-B14F-4D97-AF65-F5344CB8AC3E}">
+        <p14:creationId xmlns:p14="http://schemas.microsoft.com/office/powerpoint/2010/main" val="938831069"/>
+      </p:ext>
+    </p:extLst>
+  </p:cSld>
+  <p:clrMapOvr>
+    <a:masterClrMapping/>
+  </p:clrMapOvr>
+</p:sld>
+</file>
+
+<file path=ppt/slides/slide11.xml><?xml version="1.0" encoding="utf-8"?>
+<p:sld xmlns:a="http://schemas.openxmlformats.org/drawingml/2006/main" xmlns:r="http://schemas.openxmlformats.org/officeDocument/2006/relationships" xmlns:p="http://schemas.openxmlformats.org/presentationml/2006/main">
+  <p:cSld>
+    <p:spTree>
+      <p:nvGrpSpPr>
+        <p:cNvPr id="1" name=""/>
+        <p:cNvGrpSpPr/>
+        <p:nvPr/>
+      </p:nvGrpSpPr>
+      <p:grpSpPr>
+        <a:xfrm>
+          <a:off x="0" y="0"/>
+          <a:ext cx="0" cy="0"/>
+          <a:chOff x="0" y="0"/>
+          <a:chExt cx="0" cy="0"/>
+        </a:xfrm>
+      </p:grpSpPr>
+      <p:sp>
+        <p:nvSpPr>
+          <p:cNvPr id="2" name="Title 1">
+            <a:extLst>
+              <a:ext uri="{FF2B5EF4-FFF2-40B4-BE49-F238E27FC236}">
+                <a16:creationId xmlns:a16="http://schemas.microsoft.com/office/drawing/2014/main" id="{9F5AD2DB-21B5-4C5B-9D66-7D2E872FEE41}"/>
+              </a:ext>
+            </a:extLst>
+          </p:cNvPr>
+          <p:cNvSpPr>
+            <a:spLocks noGrp="1"/>
+          </p:cNvSpPr>
+          <p:nvPr>
+            <p:ph type="title"/>
+          </p:nvPr>
+        </p:nvSpPr>
+        <p:spPr/>
+        <p:txBody>
+          <a:bodyPr/>
+          <a:lstStyle/>
+          <a:p>
+            <a:r>
+              <a:rPr lang="en-GB" dirty="0">
+                <a:latin typeface="Bahnschrift SemiBold Condensed"/>
+              </a:rPr>
+              <a:t>Software Organisation</a:t>
+            </a:r>
+            <a:endParaRPr lang="en-GB" dirty="0"/>
+          </a:p>
+        </p:txBody>
+      </p:sp>
+      <p:sp>
+        <p:nvSpPr>
+          <p:cNvPr id="3" name="Content Placeholder 2">
+            <a:extLst>
+              <a:ext uri="{FF2B5EF4-FFF2-40B4-BE49-F238E27FC236}">
+                <a16:creationId xmlns:a16="http://schemas.microsoft.com/office/drawing/2014/main" id="{16FE3C49-8ABF-43A6-B3B3-9DC2D457A414}"/>
+              </a:ext>
+            </a:extLst>
+          </p:cNvPr>
+          <p:cNvSpPr>
+            <a:spLocks noGrp="1"/>
+          </p:cNvSpPr>
+          <p:nvPr>
+            <p:ph idx="1"/>
+          </p:nvPr>
+        </p:nvSpPr>
+        <p:spPr/>
+        <p:txBody>
+          <a:bodyPr vert="horz" lIns="91440" tIns="45720" rIns="91440" bIns="45720" rtlCol="0" anchor="t">
+            <a:normAutofit/>
+          </a:bodyPr>
+          <a:lstStyle/>
+          <a:p>
+            <a:r>
+              <a:rPr lang="en-GB" dirty="0">
+                <a:cs typeface="Calibri"/>
+              </a:rPr>
+              <a:t>Four main software parts:</a:t>
+            </a:r>
+          </a:p>
+          <a:p>
+            <a:pPr lvl="1"/>
+            <a:r>
+              <a:rPr lang="en-GB" dirty="0" err="1">
+                <a:solidFill>
+                  <a:schemeClr val="accent6"/>
+                </a:solidFill>
+                <a:cs typeface="Calibri"/>
+              </a:rPr>
+              <a:t>obc</a:t>
+            </a:r>
+            <a:r>
+              <a:rPr lang="en-GB" dirty="0">
+                <a:solidFill>
+                  <a:schemeClr val="accent6"/>
+                </a:solidFill>
+                <a:cs typeface="Calibri"/>
+              </a:rPr>
+              <a:t>-firmware</a:t>
+            </a:r>
+            <a:r>
+              <a:rPr lang="en-GB" dirty="0">
+                <a:cs typeface="Calibri"/>
+              </a:rPr>
+              <a:t>: code that runs on the OBC and executes the mission, </a:t>
+            </a:r>
+            <a:r>
+              <a:rPr lang="en-GB" b="1" dirty="0">
+                <a:cs typeface="Calibri"/>
+              </a:rPr>
+              <a:t>45% complete</a:t>
+            </a:r>
+          </a:p>
+          <a:p>
+            <a:pPr marL="914400" lvl="2" indent="0">
+              <a:buNone/>
+            </a:pPr>
+            <a:r>
+              <a:rPr lang="en-GB" sz="1400" i="1" dirty="0">
+                <a:cs typeface="Calibri"/>
+              </a:rPr>
+              <a:t>(also called "the software", "flight software" etc.)</a:t>
+            </a:r>
+            <a:endParaRPr lang="en-GB" sz="1400">
+              <a:cs typeface="Calibri"/>
+            </a:endParaRPr>
+          </a:p>
+          <a:p>
+            <a:pPr lvl="1"/>
+            <a:r>
+              <a:rPr lang="en-GB" dirty="0">
+                <a:solidFill>
+                  <a:schemeClr val="accent6"/>
+                </a:solidFill>
+                <a:cs typeface="Calibri"/>
+              </a:rPr>
+              <a:t>eps-firmware</a:t>
+            </a:r>
+            <a:r>
+              <a:rPr lang="en-GB" dirty="0">
+                <a:cs typeface="Calibri"/>
+              </a:rPr>
+              <a:t>: controls the EPS circuitry, is commanded by the OBC, </a:t>
+            </a:r>
+            <a:r>
+              <a:rPr lang="en-GB" b="1" dirty="0">
+                <a:cs typeface="Calibri"/>
+              </a:rPr>
+              <a:t>80% complete</a:t>
+            </a:r>
+          </a:p>
+          <a:p>
+            <a:pPr lvl="1"/>
+            <a:r>
+              <a:rPr lang="en-GB" dirty="0" err="1">
+                <a:solidFill>
+                  <a:schemeClr val="accent6"/>
+                </a:solidFill>
+                <a:cs typeface="Calibri"/>
+              </a:rPr>
+              <a:t>tx</a:t>
+            </a:r>
+            <a:r>
+              <a:rPr lang="en-GB" dirty="0">
+                <a:solidFill>
+                  <a:schemeClr val="accent6"/>
+                </a:solidFill>
+                <a:cs typeface="Calibri"/>
+              </a:rPr>
+              <a:t>-manager-firmware</a:t>
+            </a:r>
+            <a:r>
+              <a:rPr lang="en-GB" dirty="0">
+                <a:cs typeface="Calibri"/>
+              </a:rPr>
+              <a:t>: purpose not entirely clear, runs on TX Manager and prevents transmission before required ESA timeout after launch, </a:t>
+            </a:r>
+            <a:r>
+              <a:rPr lang="en-GB" b="1" dirty="0">
+                <a:cs typeface="Calibri"/>
+              </a:rPr>
+              <a:t>not started</a:t>
+            </a:r>
+          </a:p>
+          <a:p>
+            <a:pPr lvl="1"/>
+            <a:r>
+              <a:rPr lang="en-GB" dirty="0">
+                <a:solidFill>
+                  <a:schemeClr val="accent6"/>
+                </a:solidFill>
+                <a:cs typeface="Calibri"/>
+              </a:rPr>
+              <a:t>Ground station software</a:t>
+            </a:r>
+            <a:r>
+              <a:rPr lang="en-GB" dirty="0">
+                <a:cs typeface="Calibri"/>
+              </a:rPr>
+              <a:t>: runs on the ground and is used to send commands/receive telemetry from the satellite, </a:t>
+            </a:r>
+            <a:r>
+              <a:rPr lang="en-GB" b="1" dirty="0">
+                <a:cs typeface="Calibri"/>
+              </a:rPr>
+              <a:t>status unknown</a:t>
+            </a:r>
+          </a:p>
+        </p:txBody>
+      </p:sp>
+      <p:sp>
+        <p:nvSpPr>
+          <p:cNvPr id="4" name="Footer Placeholder 3">
+            <a:extLst>
+              <a:ext uri="{FF2B5EF4-FFF2-40B4-BE49-F238E27FC236}">
+                <a16:creationId xmlns:a16="http://schemas.microsoft.com/office/drawing/2014/main" id="{5A84E092-7FCA-4E38-8BF3-5330F8682D75}"/>
+              </a:ext>
+            </a:extLst>
+          </p:cNvPr>
+          <p:cNvSpPr>
+            <a:spLocks noGrp="1"/>
+          </p:cNvSpPr>
+          <p:nvPr>
+            <p:ph type="ftr" sz="quarter" idx="11"/>
+          </p:nvPr>
+        </p:nvSpPr>
+        <p:spPr/>
+        <p:txBody>
+          <a:bodyPr/>
+          <a:lstStyle/>
+          <a:p>
+            <a:r>
+              <a:rPr lang="en-GB"/>
+              <a:t>SUSF – UoS3 Training Scheme</a:t>
+            </a:r>
+          </a:p>
+        </p:txBody>
+      </p:sp>
+      <p:sp>
+        <p:nvSpPr>
+          <p:cNvPr id="5" name="Slide Number Placeholder 4">
+            <a:extLst>
+              <a:ext uri="{FF2B5EF4-FFF2-40B4-BE49-F238E27FC236}">
+                <a16:creationId xmlns:a16="http://schemas.microsoft.com/office/drawing/2014/main" id="{27846180-B7C8-4980-A57A-3402CDB75725}"/>
+              </a:ext>
+            </a:extLst>
+          </p:cNvPr>
+          <p:cNvSpPr>
+            <a:spLocks noGrp="1"/>
+          </p:cNvSpPr>
+          <p:nvPr>
+            <p:ph type="sldNum" sz="quarter" idx="12"/>
+          </p:nvPr>
+        </p:nvSpPr>
+        <p:spPr/>
+        <p:txBody>
+          <a:bodyPr/>
+          <a:lstStyle/>
+          <a:p>
+            <a:fld id="{409D42ED-5227-461B-93AD-5F9E0026A866}" type="slidenum">
+              <a:rPr lang="en-GB" smtClean="0"/>
+              <a:t>11</a:t>
+            </a:fld>
+            <a:endParaRPr lang="en-GB"/>
+          </a:p>
+        </p:txBody>
+      </p:sp>
+    </p:spTree>
+    <p:extLst>
+      <p:ext uri="{BB962C8B-B14F-4D97-AF65-F5344CB8AC3E}">
+        <p14:creationId xmlns:p14="http://schemas.microsoft.com/office/powerpoint/2010/main" val="2474391567"/>
+      </p:ext>
+    </p:extLst>
+  </p:cSld>
+  <p:clrMapOvr>
+    <a:masterClrMapping/>
+  </p:clrMapOvr>
+</p:sld>
+</file>
+
+<file path=ppt/slides/slide12.xml><?xml version="1.0" encoding="utf-8"?>
+<p:sld xmlns:a="http://schemas.openxmlformats.org/drawingml/2006/main" xmlns:r="http://schemas.openxmlformats.org/officeDocument/2006/relationships" xmlns:p="http://schemas.openxmlformats.org/presentationml/2006/main">
+  <p:cSld>
+    <p:spTree>
+      <p:nvGrpSpPr>
+        <p:cNvPr id="1" name=""/>
+        <p:cNvGrpSpPr/>
+        <p:nvPr/>
+      </p:nvGrpSpPr>
+      <p:grpSpPr>
+        <a:xfrm>
+          <a:off x="0" y="0"/>
+          <a:ext cx="0" cy="0"/>
+          <a:chOff x="0" y="0"/>
+          <a:chExt cx="0" cy="0"/>
+        </a:xfrm>
+      </p:grpSpPr>
+      <p:sp>
+        <p:nvSpPr>
+          <p:cNvPr id="2" name="Title 1">
+            <a:extLst>
+              <a:ext uri="{FF2B5EF4-FFF2-40B4-BE49-F238E27FC236}">
+                <a16:creationId xmlns:a16="http://schemas.microsoft.com/office/drawing/2014/main" id="{E19A0EF2-C267-4AFB-A9F3-64EE4CF1871C}"/>
+              </a:ext>
+            </a:extLst>
+          </p:cNvPr>
+          <p:cNvSpPr>
+            <a:spLocks noGrp="1"/>
+          </p:cNvSpPr>
+          <p:nvPr>
+            <p:ph type="title"/>
+          </p:nvPr>
+        </p:nvSpPr>
+        <p:spPr/>
+        <p:txBody>
+          <a:bodyPr/>
+          <a:lstStyle/>
+          <a:p>
+            <a:r>
+              <a:rPr lang="en-GB" dirty="0">
+                <a:latin typeface="Bahnschrift SemiBold Condensed"/>
+              </a:rPr>
+              <a:t>Software Tooling</a:t>
+            </a:r>
+            <a:endParaRPr lang="en-US" dirty="0"/>
+          </a:p>
+        </p:txBody>
+      </p:sp>
+      <p:sp>
+        <p:nvSpPr>
+          <p:cNvPr id="3" name="Content Placeholder 2">
+            <a:extLst>
+              <a:ext uri="{FF2B5EF4-FFF2-40B4-BE49-F238E27FC236}">
+                <a16:creationId xmlns:a16="http://schemas.microsoft.com/office/drawing/2014/main" id="{95AC78F8-4309-4071-832C-AE425CCAE46C}"/>
+              </a:ext>
+            </a:extLst>
+          </p:cNvPr>
+          <p:cNvSpPr>
+            <a:spLocks noGrp="1"/>
+          </p:cNvSpPr>
+          <p:nvPr>
+            <p:ph idx="1"/>
+          </p:nvPr>
+        </p:nvSpPr>
+        <p:spPr/>
+        <p:txBody>
+          <a:bodyPr vert="horz" lIns="91440" tIns="45720" rIns="91440" bIns="45720" rtlCol="0" anchor="t">
+            <a:normAutofit/>
+          </a:bodyPr>
+          <a:lstStyle/>
+          <a:p>
+            <a:r>
+              <a:rPr lang="en-GB" dirty="0">
+                <a:cs typeface="Calibri"/>
+              </a:rPr>
+              <a:t>All </a:t>
+            </a:r>
+            <a:r>
+              <a:rPr lang="en-GB" dirty="0" err="1">
+                <a:cs typeface="Calibri"/>
+              </a:rPr>
+              <a:t>firmwares</a:t>
+            </a:r>
+            <a:r>
+              <a:rPr lang="en-GB" dirty="0">
+                <a:cs typeface="Calibri"/>
+              </a:rPr>
+              <a:t> written in C</a:t>
+            </a:r>
+          </a:p>
+          <a:p>
+            <a:r>
+              <a:rPr lang="en-GB" dirty="0">
+                <a:cs typeface="Calibri"/>
+              </a:rPr>
+              <a:t>Stored on </a:t>
+            </a:r>
+            <a:r>
+              <a:rPr lang="en-GB" dirty="0" err="1">
+                <a:cs typeface="Calibri"/>
+              </a:rPr>
+              <a:t>github</a:t>
+            </a:r>
+            <a:r>
+              <a:rPr lang="en-GB" dirty="0">
+                <a:cs typeface="Calibri"/>
+              </a:rPr>
+              <a:t> at </a:t>
+            </a:r>
+            <a:r>
+              <a:rPr lang="en-GB" dirty="0">
+                <a:ea typeface="+mn-lt"/>
+                <a:cs typeface="+mn-lt"/>
+                <a:hlinkClick r:id="rId2"/>
+              </a:rPr>
+              <a:t>https://github.com/uos3</a:t>
+            </a:r>
+            <a:r>
+              <a:rPr lang="en-GB" dirty="0">
+                <a:ea typeface="+mn-lt"/>
+                <a:cs typeface="+mn-lt"/>
+              </a:rPr>
+              <a:t>, use of git branches and pull requests is strongly advised</a:t>
+            </a:r>
+          </a:p>
+          <a:p>
+            <a:r>
+              <a:rPr lang="en-GB" dirty="0">
+                <a:cs typeface="Calibri"/>
+              </a:rPr>
+              <a:t>MUST follow software writing standard </a:t>
+            </a:r>
+            <a:r>
+              <a:rPr lang="en-GB" dirty="0">
+                <a:ea typeface="+mn-lt"/>
+                <a:cs typeface="+mn-lt"/>
+                <a:hlinkClick r:id="rId3"/>
+              </a:rPr>
+              <a:t>https://github.com/uos3/obc-firmware/blob/master/docs/standards/sws.md</a:t>
+            </a:r>
+            <a:r>
+              <a:rPr lang="en-GB" dirty="0">
+                <a:ea typeface="+mn-lt"/>
+                <a:cs typeface="+mn-lt"/>
+              </a:rPr>
+              <a:t> </a:t>
+            </a:r>
+          </a:p>
+          <a:p>
+            <a:r>
+              <a:rPr lang="en-GB" dirty="0">
+                <a:ea typeface="+mn-lt"/>
+                <a:cs typeface="+mn-lt"/>
+              </a:rPr>
+              <a:t>Linux machine required for development, if on windows use Windows Subsystem for Linux (WSL), or a virtual machine for development</a:t>
+            </a:r>
+          </a:p>
+          <a:p>
+            <a:endParaRPr lang="en-GB" dirty="0">
+              <a:ea typeface="+mn-lt"/>
+              <a:cs typeface="+mn-lt"/>
+            </a:endParaRPr>
+          </a:p>
+        </p:txBody>
+      </p:sp>
+      <p:sp>
+        <p:nvSpPr>
+          <p:cNvPr id="4" name="Footer Placeholder 3">
+            <a:extLst>
+              <a:ext uri="{FF2B5EF4-FFF2-40B4-BE49-F238E27FC236}">
+                <a16:creationId xmlns:a16="http://schemas.microsoft.com/office/drawing/2014/main" id="{F20F9D5A-E080-411A-B15A-F0650C664640}"/>
+              </a:ext>
+            </a:extLst>
+          </p:cNvPr>
+          <p:cNvSpPr>
+            <a:spLocks noGrp="1"/>
+          </p:cNvSpPr>
+          <p:nvPr>
+            <p:ph type="ftr" sz="quarter" idx="11"/>
+          </p:nvPr>
+        </p:nvSpPr>
+        <p:spPr/>
+        <p:txBody>
+          <a:bodyPr/>
+          <a:lstStyle/>
+          <a:p>
+            <a:r>
+              <a:rPr lang="en-GB"/>
+              <a:t>SUSF – UoS3 Training Scheme</a:t>
+            </a:r>
+          </a:p>
+        </p:txBody>
+      </p:sp>
+      <p:sp>
+        <p:nvSpPr>
+          <p:cNvPr id="5" name="Slide Number Placeholder 4">
+            <a:extLst>
+              <a:ext uri="{FF2B5EF4-FFF2-40B4-BE49-F238E27FC236}">
+                <a16:creationId xmlns:a16="http://schemas.microsoft.com/office/drawing/2014/main" id="{3E315D9C-464F-4F34-AB41-7F394551CAE2}"/>
+              </a:ext>
+            </a:extLst>
+          </p:cNvPr>
+          <p:cNvSpPr>
+            <a:spLocks noGrp="1"/>
+          </p:cNvSpPr>
+          <p:nvPr>
+            <p:ph type="sldNum" sz="quarter" idx="12"/>
+          </p:nvPr>
+        </p:nvSpPr>
+        <p:spPr/>
+        <p:txBody>
+          <a:bodyPr/>
+          <a:lstStyle/>
+          <a:p>
+            <a:fld id="{409D42ED-5227-461B-93AD-5F9E0026A866}" type="slidenum">
+              <a:rPr lang="en-GB" smtClean="0"/>
+              <a:t>12</a:t>
+            </a:fld>
+            <a:endParaRPr lang="en-GB"/>
+          </a:p>
+        </p:txBody>
+      </p:sp>
+    </p:spTree>
+    <p:extLst>
+      <p:ext uri="{BB962C8B-B14F-4D97-AF65-F5344CB8AC3E}">
+        <p14:creationId xmlns:p14="http://schemas.microsoft.com/office/powerpoint/2010/main" val="2136263655"/>
+      </p:ext>
+    </p:extLst>
+  </p:cSld>
+  <p:clrMapOvr>
+    <a:masterClrMapping/>
+  </p:clrMapOvr>
+</p:sld>
+</file>
+
+<file path=ppt/slides/slide13.xml><?xml version="1.0" encoding="utf-8"?>
+<p:sld xmlns:a="http://schemas.openxmlformats.org/drawingml/2006/main" xmlns:r="http://schemas.openxmlformats.org/officeDocument/2006/relationships" xmlns:p="http://schemas.openxmlformats.org/presentationml/2006/main">
+  <p:cSld>
+    <p:spTree>
+      <p:nvGrpSpPr>
+        <p:cNvPr id="1" name=""/>
+        <p:cNvGrpSpPr/>
+        <p:nvPr/>
+      </p:nvGrpSpPr>
+      <p:grpSpPr>
+        <a:xfrm>
+          <a:off x="0" y="0"/>
+          <a:ext cx="0" cy="0"/>
+          <a:chOff x="0" y="0"/>
+          <a:chExt cx="0" cy="0"/>
+        </a:xfrm>
+      </p:grpSpPr>
+      <p:sp>
+        <p:nvSpPr>
+          <p:cNvPr id="2" name="Title 1">
+            <a:extLst>
+              <a:ext uri="{FF2B5EF4-FFF2-40B4-BE49-F238E27FC236}">
+                <a16:creationId xmlns:a16="http://schemas.microsoft.com/office/drawing/2014/main" id="{0D96DABB-7395-4455-BACF-38A36527E060}"/>
+              </a:ext>
+            </a:extLst>
+          </p:cNvPr>
+          <p:cNvSpPr>
+            <a:spLocks noGrp="1"/>
+          </p:cNvSpPr>
+          <p:nvPr>
+            <p:ph type="title"/>
+          </p:nvPr>
+        </p:nvSpPr>
+        <p:spPr/>
+        <p:txBody>
+          <a:bodyPr/>
+          <a:lstStyle/>
+          <a:p>
+            <a:r>
+              <a:rPr lang="en-GB" dirty="0">
+                <a:latin typeface="Bahnschrift SemiBold Condensed"/>
+              </a:rPr>
+              <a:t>Internship Training</a:t>
+            </a:r>
+            <a:endParaRPr lang="en-GB" dirty="0"/>
+          </a:p>
+        </p:txBody>
+      </p:sp>
+      <p:sp>
+        <p:nvSpPr>
+          <p:cNvPr id="3" name="Content Placeholder 2">
+            <a:extLst>
+              <a:ext uri="{FF2B5EF4-FFF2-40B4-BE49-F238E27FC236}">
+                <a16:creationId xmlns:a16="http://schemas.microsoft.com/office/drawing/2014/main" id="{D4AC85E3-8E37-4B14-A642-E502BBC21591}"/>
+              </a:ext>
+            </a:extLst>
+          </p:cNvPr>
+          <p:cNvSpPr>
+            <a:spLocks noGrp="1"/>
+          </p:cNvSpPr>
+          <p:nvPr>
+            <p:ph idx="1"/>
+          </p:nvPr>
+        </p:nvSpPr>
+        <p:spPr/>
+        <p:txBody>
+          <a:bodyPr vert="horz" lIns="91440" tIns="45720" rIns="91440" bIns="45720" rtlCol="0" anchor="t">
+            <a:normAutofit/>
+          </a:bodyPr>
+          <a:lstStyle/>
+          <a:p>
+            <a:r>
+              <a:rPr lang="en-GB" dirty="0">
+                <a:cs typeface="Calibri"/>
+              </a:rPr>
+              <a:t>This week:</a:t>
+            </a:r>
+          </a:p>
+          <a:p>
+            <a:pPr lvl="1"/>
+            <a:r>
+              <a:rPr lang="en-GB" dirty="0">
+                <a:cs typeface="Calibri"/>
+              </a:rPr>
+              <a:t>Get </a:t>
+            </a:r>
+            <a:r>
+              <a:rPr lang="en-GB" dirty="0" err="1">
+                <a:cs typeface="Calibri"/>
+              </a:rPr>
+              <a:t>sharepoint</a:t>
+            </a:r>
+            <a:r>
+              <a:rPr lang="en-GB" dirty="0">
+                <a:cs typeface="Calibri"/>
+              </a:rPr>
+              <a:t> and </a:t>
+            </a:r>
+            <a:r>
+              <a:rPr lang="en-GB" dirty="0" err="1">
+                <a:cs typeface="Calibri"/>
+              </a:rPr>
+              <a:t>github</a:t>
+            </a:r>
+            <a:r>
+              <a:rPr lang="en-GB" dirty="0">
+                <a:cs typeface="Calibri"/>
+              </a:rPr>
+              <a:t> access</a:t>
+            </a:r>
+          </a:p>
+          <a:p>
+            <a:pPr lvl="1"/>
+            <a:r>
+              <a:rPr lang="en-GB" dirty="0">
+                <a:cs typeface="Calibri"/>
+              </a:rPr>
+              <a:t>Read last year's GDP report: </a:t>
+            </a:r>
+          </a:p>
+          <a:p>
+            <a:pPr lvl="1"/>
+            <a:r>
+              <a:rPr lang="en-GB" dirty="0">
+                <a:cs typeface="Calibri"/>
+              </a:rPr>
+              <a:t>Read design journals (Duncan, Daniel, and Roberto for now):</a:t>
+            </a:r>
+          </a:p>
+          <a:p>
+            <a:pPr lvl="1"/>
+            <a:r>
+              <a:rPr lang="en-GB" dirty="0">
+                <a:cs typeface="Calibri"/>
+              </a:rPr>
+              <a:t>Setup software development environment (live call, probably Friday)</a:t>
+            </a:r>
+          </a:p>
+          <a:p>
+            <a:r>
+              <a:rPr lang="en-GB" dirty="0">
+                <a:cs typeface="Calibri"/>
+              </a:rPr>
+              <a:t>Next week:</a:t>
+            </a:r>
+          </a:p>
+          <a:p>
+            <a:pPr lvl="1"/>
+            <a:r>
+              <a:rPr lang="en-GB" dirty="0">
+                <a:cs typeface="Calibri"/>
+              </a:rPr>
+              <a:t>Guided tour of current software &amp; electronics state</a:t>
+            </a:r>
+          </a:p>
+          <a:p>
+            <a:pPr lvl="1"/>
+            <a:r>
+              <a:rPr lang="en-GB" dirty="0">
+                <a:cs typeface="Calibri"/>
+              </a:rPr>
+              <a:t>C crash course</a:t>
+            </a:r>
+          </a:p>
+          <a:p>
+            <a:pPr lvl="1"/>
+            <a:r>
+              <a:rPr lang="en-GB" dirty="0">
+                <a:cs typeface="Calibri"/>
+              </a:rPr>
+              <a:t>(potential) demo of hardware in propulsion lab</a:t>
+            </a:r>
+          </a:p>
+        </p:txBody>
+      </p:sp>
+      <p:sp>
+        <p:nvSpPr>
+          <p:cNvPr id="4" name="Footer Placeholder 3">
+            <a:extLst>
+              <a:ext uri="{FF2B5EF4-FFF2-40B4-BE49-F238E27FC236}">
+                <a16:creationId xmlns:a16="http://schemas.microsoft.com/office/drawing/2014/main" id="{39C85B2A-6D69-429B-A4CE-0ED3E9B9181D}"/>
+              </a:ext>
+            </a:extLst>
+          </p:cNvPr>
+          <p:cNvSpPr>
+            <a:spLocks noGrp="1"/>
+          </p:cNvSpPr>
+          <p:nvPr>
+            <p:ph type="ftr" sz="quarter" idx="11"/>
+          </p:nvPr>
+        </p:nvSpPr>
+        <p:spPr/>
+        <p:txBody>
+          <a:bodyPr/>
+          <a:lstStyle/>
+          <a:p>
+            <a:r>
+              <a:rPr lang="en-GB"/>
+              <a:t>SUSF – UoS3 Training Scheme</a:t>
+            </a:r>
+          </a:p>
+        </p:txBody>
+      </p:sp>
+      <p:sp>
+        <p:nvSpPr>
+          <p:cNvPr id="5" name="Slide Number Placeholder 4">
+            <a:extLst>
+              <a:ext uri="{FF2B5EF4-FFF2-40B4-BE49-F238E27FC236}">
+                <a16:creationId xmlns:a16="http://schemas.microsoft.com/office/drawing/2014/main" id="{07CE6C6D-54A9-4C53-8CA3-68133683C2D4}"/>
+              </a:ext>
+            </a:extLst>
+          </p:cNvPr>
+          <p:cNvSpPr>
+            <a:spLocks noGrp="1"/>
+          </p:cNvSpPr>
+          <p:nvPr>
+            <p:ph type="sldNum" sz="quarter" idx="12"/>
+          </p:nvPr>
+        </p:nvSpPr>
+        <p:spPr/>
+        <p:txBody>
+          <a:bodyPr/>
+          <a:lstStyle/>
+          <a:p>
+            <a:fld id="{409D42ED-5227-461B-93AD-5F9E0026A866}" type="slidenum">
+              <a:rPr lang="en-GB" smtClean="0"/>
+              <a:t>13</a:t>
+            </a:fld>
+            <a:endParaRPr lang="en-GB"/>
+          </a:p>
+        </p:txBody>
+      </p:sp>
+    </p:spTree>
+    <p:extLst>
+      <p:ext uri="{BB962C8B-B14F-4D97-AF65-F5344CB8AC3E}">
+        <p14:creationId xmlns:p14="http://schemas.microsoft.com/office/powerpoint/2010/main" val="3660392004"/>
+      </p:ext>
+    </p:extLst>
+  </p:cSld>
+  <p:clrMapOvr>
+    <a:masterClrMapping/>
+  </p:clrMapOvr>
+</p:sld>
+</file>
+
 <file path=ppt/slides/slide2.xml><?xml version="1.0" encoding="utf-8"?>
 <p:sld xmlns:a="http://schemas.openxmlformats.org/drawingml/2006/main" xmlns:r="http://schemas.openxmlformats.org/officeDocument/2006/relationships" xmlns:p="http://schemas.openxmlformats.org/presentationml/2006/main">
   <p:cSld>
@@ -4647,7 +5837,7 @@
           <p:cNvPr id="2" name="Title 1">
             <a:extLst>
               <a:ext uri="{FF2B5EF4-FFF2-40B4-BE49-F238E27FC236}">
-                <a16:creationId xmlns:a16="http://schemas.microsoft.com/office/drawing/2014/main" id="{42567068-D688-4715-96FD-2356544A718C}"/>
+                <a16:creationId xmlns:a16="http://schemas.microsoft.com/office/drawing/2014/main" id="{9C26A3F8-8EF0-41F0-91D6-30FD90C6AE1B}"/>
               </a:ext>
             </a:extLst>
           </p:cNvPr>
@@ -4658,262 +5848,103 @@
             <p:ph type="title"/>
           </p:nvPr>
         </p:nvSpPr>
-        <p:spPr>
-          <a:xfrm>
-            <a:off x="838200" y="365125"/>
-            <a:ext cx="10515600" cy="1325563"/>
-          </a:xfrm>
-        </p:spPr>
-        <p:txBody>
-          <a:bodyPr anchor="ctr">
+        <p:spPr/>
+        <p:txBody>
+          <a:bodyPr/>
+          <a:lstStyle/>
+          <a:p>
+            <a:r>
+              <a:rPr lang="en-GB" dirty="0"/>
+              <a:t>Standards</a:t>
+            </a:r>
+          </a:p>
+        </p:txBody>
+      </p:sp>
+      <p:sp>
+        <p:nvSpPr>
+          <p:cNvPr id="3" name="Content Placeholder 2">
+            <a:extLst>
+              <a:ext uri="{FF2B5EF4-FFF2-40B4-BE49-F238E27FC236}">
+                <a16:creationId xmlns:a16="http://schemas.microsoft.com/office/drawing/2014/main" id="{A76B4921-E9C4-4DE5-872C-4CE736BE42FD}"/>
+              </a:ext>
+            </a:extLst>
+          </p:cNvPr>
+          <p:cNvSpPr>
+            <a:spLocks noGrp="1"/>
+          </p:cNvSpPr>
+          <p:nvPr>
+            <p:ph idx="1"/>
+          </p:nvPr>
+        </p:nvSpPr>
+        <p:spPr/>
+        <p:txBody>
+          <a:bodyPr vert="horz" lIns="91440" tIns="45720" rIns="91440" bIns="45720" rtlCol="0" anchor="t">
             <a:normAutofit/>
           </a:bodyPr>
           <a:lstStyle/>
           <a:p>
             <a:r>
-              <a:rPr lang="en-GB" dirty="0"/>
-              <a:t>Subsystems</a:t>
-            </a:r>
-          </a:p>
-        </p:txBody>
-      </p:sp>
-      <p:pic>
-        <p:nvPicPr>
-          <p:cNvPr id="1026" name="Picture 2" descr="Diagram&#10;&#10;Description automatically generated">
-            <a:extLst>
-              <a:ext uri="{FF2B5EF4-FFF2-40B4-BE49-F238E27FC236}">
-                <a16:creationId xmlns:a16="http://schemas.microsoft.com/office/drawing/2014/main" id="{6519A92D-FBA5-41F8-8180-85C6358B3412}"/>
-              </a:ext>
-            </a:extLst>
-          </p:cNvPr>
-          <p:cNvPicPr>
-            <a:picLocks noChangeAspect="1" noChangeArrowheads="1"/>
-          </p:cNvPicPr>
-          <p:nvPr/>
-        </p:nvPicPr>
-        <p:blipFill>
-          <a:blip r:embed="rId2">
-            <a:extLst>
-              <a:ext uri="{28A0092B-C50C-407E-A947-70E740481C1C}">
-                <a14:useLocalDpi xmlns:a14="http://schemas.microsoft.com/office/drawing/2010/main" val="0"/>
-              </a:ext>
-            </a:extLst>
-          </a:blip>
-          <a:stretch>
-            <a:fillRect/>
-          </a:stretch>
-        </p:blipFill>
-        <p:spPr bwMode="auto">
-          <a:xfrm>
-            <a:off x="0" y="1497404"/>
-            <a:ext cx="3392680" cy="4679559"/>
-          </a:xfrm>
-          <a:prstGeom prst="rect">
-            <a:avLst/>
-          </a:prstGeom>
-          <a:solidFill>
-            <a:srgbClr val="FFFFFF"/>
-          </a:solidFill>
-        </p:spPr>
-      </p:pic>
-      <p:sp>
-        <p:nvSpPr>
-          <p:cNvPr id="71" name="Content Placeholder 3">
-            <a:extLst>
-              <a:ext uri="{FF2B5EF4-FFF2-40B4-BE49-F238E27FC236}">
-                <a16:creationId xmlns:a16="http://schemas.microsoft.com/office/drawing/2014/main" id="{B01C0B0B-B025-4A44-A2E0-449F2014AE18}"/>
-              </a:ext>
-            </a:extLst>
-          </p:cNvPr>
-          <p:cNvSpPr>
-            <a:spLocks noGrp="1"/>
-          </p:cNvSpPr>
-          <p:nvPr>
-            <p:ph sz="half" idx="2"/>
-          </p:nvPr>
-        </p:nvSpPr>
-        <p:spPr>
-          <a:xfrm>
-            <a:off x="4038600" y="1825625"/>
-            <a:ext cx="7315200" cy="4351338"/>
-          </a:xfrm>
-        </p:spPr>
-        <p:txBody>
-          <a:bodyPr>
-            <a:normAutofit fontScale="85000" lnSpcReduction="20000"/>
-          </a:bodyPr>
-          <a:lstStyle/>
-          <a:p>
-            <a:r>
-              <a:rPr lang="en-US" dirty="0">
-                <a:solidFill>
-                  <a:schemeClr val="accent6"/>
-                </a:solidFill>
+              <a:rPr lang="en-GB" dirty="0">
+                <a:cs typeface="Calibri"/>
               </a:rPr>
-              <a:t>Structure</a:t>
-            </a:r>
-            <a:r>
-              <a:rPr lang="en-US" dirty="0"/>
-              <a:t> </a:t>
-            </a:r>
-            <a:endParaRPr lang="en-US" sz="2200" dirty="0"/>
-          </a:p>
-          <a:p>
-            <a:pPr marL="457200" lvl="1" indent="0">
-              <a:buNone/>
-            </a:pPr>
-            <a:r>
-              <a:rPr lang="en-US" sz="1800" dirty="0"/>
-              <a:t>supports the CubeSat’s components</a:t>
-            </a:r>
-          </a:p>
-          <a:p>
-            <a:r>
-              <a:rPr lang="en-US" dirty="0">
-                <a:solidFill>
-                  <a:schemeClr val="accent6"/>
-                </a:solidFill>
+              <a:t>External:</a:t>
+            </a:r>
+          </a:p>
+          <a:p>
+            <a:pPr lvl="1"/>
+            <a:r>
+              <a:rPr lang="en-GB" dirty="0">
+                <a:cs typeface="Calibri"/>
               </a:rPr>
-              <a:t>Antenna Deployment Mechanism (ADM)</a:t>
-            </a:r>
-            <a:r>
-              <a:rPr lang="en-US" dirty="0"/>
-              <a:t> </a:t>
-            </a:r>
-            <a:endParaRPr lang="en-US" sz="2200" dirty="0"/>
-          </a:p>
-          <a:p>
-            <a:pPr marL="457200" lvl="1" indent="0">
-              <a:buNone/>
-            </a:pPr>
-            <a:r>
-              <a:rPr lang="en-US" sz="1800" dirty="0"/>
-              <a:t>allows the antenna to be extended after deployment from the ISS</a:t>
-            </a:r>
-          </a:p>
-          <a:p>
-            <a:r>
-              <a:rPr lang="en-US" dirty="0">
-                <a:solidFill>
-                  <a:schemeClr val="accent6"/>
-                </a:solidFill>
+              <a:t>ECSS for project management, documentation, some specific areas (like packet utilisation standard)</a:t>
+            </a:r>
+          </a:p>
+          <a:p>
+            <a:endParaRPr lang="en-GB" dirty="0">
+              <a:cs typeface="Calibri"/>
+            </a:endParaRPr>
+          </a:p>
+          <a:p>
+            <a:r>
+              <a:rPr lang="en-GB" dirty="0">
+                <a:cs typeface="Calibri"/>
               </a:rPr>
-              <a:t>Electrical Power Subsystem (EPS) </a:t>
-            </a:r>
-            <a:endParaRPr lang="en-US" sz="2200" dirty="0">
-              <a:solidFill>
-                <a:schemeClr val="accent6"/>
-              </a:solidFill>
+              <a:t>Internal:</a:t>
+            </a:r>
+          </a:p>
+          <a:p>
+            <a:pPr lvl="1"/>
+            <a:r>
+              <a:rPr lang="en-GB" dirty="0">
+                <a:cs typeface="Calibri"/>
+              </a:rPr>
+              <a:t>Software writing standard (SWS) for ALL code</a:t>
+            </a:r>
+          </a:p>
+          <a:p>
+            <a:pPr lvl="1"/>
+            <a:r>
+              <a:rPr lang="en-GB" dirty="0">
+                <a:cs typeface="Calibri"/>
+              </a:rPr>
+              <a:t>Keep a logbook which refers to AIV roadmap tasks (the design journal standard)</a:t>
+            </a:r>
+          </a:p>
+          <a:p>
+            <a:pPr lvl="1"/>
+            <a:r>
+              <a:rPr lang="en-GB" dirty="0">
+                <a:cs typeface="Calibri"/>
+              </a:rPr>
+              <a:t>Document templates should be used</a:t>
+            </a:r>
+          </a:p>
+          <a:p>
+            <a:pPr lvl="1"/>
+            <a:endParaRPr lang="en-GB" dirty="0">
+              <a:cs typeface="Calibri"/>
             </a:endParaRPr>
           </a:p>
-          <a:p>
-            <a:pPr marL="457200" lvl="1" indent="0">
-              <a:buNone/>
-            </a:pPr>
-            <a:r>
-              <a:rPr lang="en-US" sz="1800" dirty="0"/>
-              <a:t>collects and provides regulated power to the rest of the satellite</a:t>
-            </a:r>
-          </a:p>
-          <a:p>
-            <a:r>
-              <a:rPr lang="en-US" dirty="0">
-                <a:solidFill>
-                  <a:schemeClr val="accent6"/>
-                </a:solidFill>
-              </a:rPr>
-              <a:t>Onboard Computer (OBC) </a:t>
-            </a:r>
-            <a:endParaRPr lang="en-US" sz="2200" dirty="0">
-              <a:solidFill>
-                <a:schemeClr val="accent6"/>
-              </a:solidFill>
-            </a:endParaRPr>
-          </a:p>
-          <a:p>
-            <a:pPr marL="457200" lvl="1" indent="0">
-              <a:buNone/>
-            </a:pPr>
-            <a:r>
-              <a:rPr lang="en-US" sz="1800" dirty="0"/>
-              <a:t>controls other subsystems and executes the flight software</a:t>
-            </a:r>
-          </a:p>
-          <a:p>
-            <a:r>
-              <a:rPr lang="en-US" dirty="0">
-                <a:solidFill>
-                  <a:schemeClr val="accent6"/>
-                </a:solidFill>
-              </a:rPr>
-              <a:t>Payload</a:t>
-            </a:r>
-            <a:r>
-              <a:rPr lang="en-US" dirty="0"/>
-              <a:t> </a:t>
-            </a:r>
-            <a:endParaRPr lang="en-US" sz="2200" dirty="0"/>
-          </a:p>
-          <a:p>
-            <a:pPr marL="457200" lvl="1" indent="0">
-              <a:buNone/>
-            </a:pPr>
-            <a:r>
-              <a:rPr lang="en-US" sz="1800" dirty="0"/>
-              <a:t>collects data to fulfil the mission objectives</a:t>
-            </a:r>
-          </a:p>
-          <a:p>
-            <a:r>
-              <a:rPr lang="en-US" dirty="0">
-                <a:solidFill>
-                  <a:schemeClr val="accent6"/>
-                </a:solidFill>
-              </a:rPr>
-              <a:t>Telemetry, Tracking, and Command (TT&amp;C) </a:t>
-            </a:r>
-            <a:endParaRPr lang="en-US" sz="2200" dirty="0">
-              <a:solidFill>
-                <a:schemeClr val="accent6"/>
-              </a:solidFill>
-            </a:endParaRPr>
-          </a:p>
-          <a:p>
-            <a:pPr marL="457200" lvl="1" indent="0">
-              <a:buNone/>
-            </a:pPr>
-            <a:r>
-              <a:rPr lang="en-US" sz="1800" dirty="0"/>
-              <a:t>provides 2-way communications between the satellite and ground</a:t>
-            </a:r>
-          </a:p>
-          <a:p>
-            <a:r>
-              <a:rPr lang="en-US" dirty="0">
-                <a:solidFill>
-                  <a:schemeClr val="accent6"/>
-                </a:solidFill>
-              </a:rPr>
-              <a:t>Attitude and Orbital Control Subsystem (AOCS) </a:t>
-            </a:r>
-            <a:endParaRPr lang="en-US" sz="2200" dirty="0">
-              <a:solidFill>
-                <a:schemeClr val="accent6"/>
-              </a:solidFill>
-            </a:endParaRPr>
-          </a:p>
-          <a:p>
-            <a:pPr marL="457200" lvl="1" indent="0">
-              <a:buNone/>
-            </a:pPr>
-            <a:r>
-              <a:rPr lang="en-US" sz="1800" dirty="0"/>
-              <a:t>passively controls the attitude (orientation) of the satellite</a:t>
-            </a:r>
-          </a:p>
-          <a:p>
-            <a:endParaRPr lang="en-US" dirty="0"/>
-          </a:p>
         </p:txBody>
       </p:sp>
       <p:sp>
@@ -4921,7 +5952,7 @@
           <p:cNvPr id="4" name="Footer Placeholder 3">
             <a:extLst>
               <a:ext uri="{FF2B5EF4-FFF2-40B4-BE49-F238E27FC236}">
-                <a16:creationId xmlns:a16="http://schemas.microsoft.com/office/drawing/2014/main" id="{487B6196-4564-4B85-A90D-87DC96F90B46}"/>
+                <a16:creationId xmlns:a16="http://schemas.microsoft.com/office/drawing/2014/main" id="{7B2EC326-FE94-44FA-9B8D-BA3CA249A407}"/>
               </a:ext>
             </a:extLst>
           </p:cNvPr>
@@ -4932,23 +5963,11 @@
             <p:ph type="ftr" sz="quarter" idx="11"/>
           </p:nvPr>
         </p:nvSpPr>
-        <p:spPr>
-          <a:xfrm>
-            <a:off x="4038600" y="6356350"/>
-            <a:ext cx="4114800" cy="365125"/>
-          </a:xfrm>
-        </p:spPr>
-        <p:txBody>
-          <a:bodyPr anchor="ctr">
-            <a:normAutofit/>
-          </a:bodyPr>
-          <a:lstStyle/>
-          <a:p>
-            <a:pPr>
-              <a:spcAft>
-                <a:spcPts val="600"/>
-              </a:spcAft>
-            </a:pPr>
+        <p:spPr/>
+        <p:txBody>
+          <a:bodyPr/>
+          <a:lstStyle/>
+          <a:p>
             <a:r>
               <a:rPr lang="en-GB"/>
               <a:t>SUSF – UoS3 Training Scheme</a:t>
@@ -4961,7 +5980,7 @@
           <p:cNvPr id="5" name="Slide Number Placeholder 4">
             <a:extLst>
               <a:ext uri="{FF2B5EF4-FFF2-40B4-BE49-F238E27FC236}">
-                <a16:creationId xmlns:a16="http://schemas.microsoft.com/office/drawing/2014/main" id="{13B4D938-D829-4D3E-8E7F-23FDF3CC0402}"/>
+                <a16:creationId xmlns:a16="http://schemas.microsoft.com/office/drawing/2014/main" id="{FC8E3313-548D-4A81-B04D-C30F4C3996EA}"/>
               </a:ext>
             </a:extLst>
           </p:cNvPr>
@@ -4972,30 +5991,13 @@
             <p:ph type="sldNum" sz="quarter" idx="12"/>
           </p:nvPr>
         </p:nvSpPr>
-        <p:spPr>
-          <a:xfrm>
-            <a:off x="8610600" y="6356350"/>
-            <a:ext cx="2743200" cy="365125"/>
-          </a:xfrm>
-        </p:spPr>
-        <p:txBody>
-          <a:bodyPr anchor="ctr">
-            <a:normAutofit/>
-          </a:bodyPr>
-          <a:lstStyle/>
-          <a:p>
-            <a:pPr>
-              <a:spcAft>
-                <a:spcPts val="600"/>
-              </a:spcAft>
-            </a:pPr>
+        <p:spPr/>
+        <p:txBody>
+          <a:bodyPr/>
+          <a:lstStyle/>
+          <a:p>
             <a:fld id="{409D42ED-5227-461B-93AD-5F9E0026A866}" type="slidenum">
               <a:rPr lang="en-GB" smtClean="0"/>
-              <a:pPr>
-                <a:spcAft>
-                  <a:spcPts val="600"/>
-                </a:spcAft>
-              </a:pPr>
               <a:t>5</a:t>
             </a:fld>
             <a:endParaRPr lang="en-GB"/>
@@ -5005,7 +6007,7 @@
     </p:spTree>
     <p:extLst>
       <p:ext uri="{BB962C8B-B14F-4D97-AF65-F5344CB8AC3E}">
-        <p14:creationId xmlns:p14="http://schemas.microsoft.com/office/powerpoint/2010/main" val="1991984139"/>
+        <p14:creationId xmlns:p14="http://schemas.microsoft.com/office/powerpoint/2010/main" val="3740144343"/>
       </p:ext>
     </p:extLst>
   </p:cSld>
@@ -5037,6 +6039,396 @@
           <p:cNvPr id="2" name="Title 1">
             <a:extLst>
               <a:ext uri="{FF2B5EF4-FFF2-40B4-BE49-F238E27FC236}">
+                <a16:creationId xmlns:a16="http://schemas.microsoft.com/office/drawing/2014/main" id="{42567068-D688-4715-96FD-2356544A718C}"/>
+              </a:ext>
+            </a:extLst>
+          </p:cNvPr>
+          <p:cNvSpPr>
+            <a:spLocks noGrp="1"/>
+          </p:cNvSpPr>
+          <p:nvPr>
+            <p:ph type="title"/>
+          </p:nvPr>
+        </p:nvSpPr>
+        <p:spPr>
+          <a:xfrm>
+            <a:off x="838200" y="365125"/>
+            <a:ext cx="10515600" cy="1325563"/>
+          </a:xfrm>
+        </p:spPr>
+        <p:txBody>
+          <a:bodyPr anchor="ctr">
+            <a:normAutofit/>
+          </a:bodyPr>
+          <a:lstStyle/>
+          <a:p>
+            <a:r>
+              <a:rPr lang="en-GB" dirty="0"/>
+              <a:t>Subsystems</a:t>
+            </a:r>
+          </a:p>
+        </p:txBody>
+      </p:sp>
+      <p:pic>
+        <p:nvPicPr>
+          <p:cNvPr id="1026" name="Picture 2" descr="Diagram&#10;&#10;Description automatically generated">
+            <a:extLst>
+              <a:ext uri="{FF2B5EF4-FFF2-40B4-BE49-F238E27FC236}">
+                <a16:creationId xmlns:a16="http://schemas.microsoft.com/office/drawing/2014/main" id="{6519A92D-FBA5-41F8-8180-85C6358B3412}"/>
+              </a:ext>
+            </a:extLst>
+          </p:cNvPr>
+          <p:cNvPicPr>
+            <a:picLocks noChangeAspect="1" noChangeArrowheads="1"/>
+          </p:cNvPicPr>
+          <p:nvPr/>
+        </p:nvPicPr>
+        <p:blipFill>
+          <a:blip r:embed="rId2">
+            <a:extLst>
+              <a:ext uri="{28A0092B-C50C-407E-A947-70E740481C1C}">
+                <a14:useLocalDpi xmlns:a14="http://schemas.microsoft.com/office/drawing/2010/main" val="0"/>
+              </a:ext>
+            </a:extLst>
+          </a:blip>
+          <a:stretch>
+            <a:fillRect/>
+          </a:stretch>
+        </p:blipFill>
+        <p:spPr bwMode="auto">
+          <a:xfrm>
+            <a:off x="0" y="1497404"/>
+            <a:ext cx="3392680" cy="4679559"/>
+          </a:xfrm>
+          <a:prstGeom prst="rect">
+            <a:avLst/>
+          </a:prstGeom>
+          <a:solidFill>
+            <a:srgbClr val="FFFFFF"/>
+          </a:solidFill>
+        </p:spPr>
+      </p:pic>
+      <p:sp>
+        <p:nvSpPr>
+          <p:cNvPr id="71" name="Content Placeholder 3">
+            <a:extLst>
+              <a:ext uri="{FF2B5EF4-FFF2-40B4-BE49-F238E27FC236}">
+                <a16:creationId xmlns:a16="http://schemas.microsoft.com/office/drawing/2014/main" id="{B01C0B0B-B025-4A44-A2E0-449F2014AE18}"/>
+              </a:ext>
+            </a:extLst>
+          </p:cNvPr>
+          <p:cNvSpPr>
+            <a:spLocks noGrp="1"/>
+          </p:cNvSpPr>
+          <p:nvPr>
+            <p:ph sz="half" idx="2"/>
+          </p:nvPr>
+        </p:nvSpPr>
+        <p:spPr>
+          <a:xfrm>
+            <a:off x="4038600" y="1825625"/>
+            <a:ext cx="7315200" cy="4351338"/>
+          </a:xfrm>
+        </p:spPr>
+        <p:txBody>
+          <a:bodyPr>
+            <a:normAutofit fontScale="85000" lnSpcReduction="20000"/>
+          </a:bodyPr>
+          <a:lstStyle/>
+          <a:p>
+            <a:r>
+              <a:rPr lang="en-US" dirty="0">
+                <a:solidFill>
+                  <a:schemeClr val="accent6"/>
+                </a:solidFill>
+              </a:rPr>
+              <a:t>Structure</a:t>
+            </a:r>
+            <a:r>
+              <a:rPr lang="en-US" dirty="0"/>
+              <a:t> </a:t>
+            </a:r>
+            <a:endParaRPr lang="en-US" sz="2200" dirty="0"/>
+          </a:p>
+          <a:p>
+            <a:pPr marL="457200" lvl="1" indent="0">
+              <a:buNone/>
+            </a:pPr>
+            <a:r>
+              <a:rPr lang="en-US" sz="1800" dirty="0"/>
+              <a:t>supports the CubeSat’s components</a:t>
+            </a:r>
+          </a:p>
+          <a:p>
+            <a:r>
+              <a:rPr lang="en-US" dirty="0">
+                <a:solidFill>
+                  <a:schemeClr val="accent6"/>
+                </a:solidFill>
+              </a:rPr>
+              <a:t>Antenna Deployment Mechanism (ADM)</a:t>
+            </a:r>
+            <a:r>
+              <a:rPr lang="en-US" dirty="0"/>
+              <a:t> </a:t>
+            </a:r>
+            <a:endParaRPr lang="en-US" sz="2200" dirty="0"/>
+          </a:p>
+          <a:p>
+            <a:pPr marL="457200" lvl="1" indent="0">
+              <a:buNone/>
+            </a:pPr>
+            <a:r>
+              <a:rPr lang="en-US" sz="1800" dirty="0"/>
+              <a:t>allows the antenna to be extended after deployment from the ISS</a:t>
+            </a:r>
+          </a:p>
+          <a:p>
+            <a:r>
+              <a:rPr lang="en-US" dirty="0">
+                <a:solidFill>
+                  <a:schemeClr val="accent6"/>
+                </a:solidFill>
+              </a:rPr>
+              <a:t>Electrical Power Subsystem (EPS) </a:t>
+            </a:r>
+            <a:endParaRPr lang="en-US" sz="2200" dirty="0">
+              <a:solidFill>
+                <a:schemeClr val="accent6"/>
+              </a:solidFill>
+            </a:endParaRPr>
+          </a:p>
+          <a:p>
+            <a:pPr marL="457200" lvl="1" indent="0">
+              <a:buNone/>
+            </a:pPr>
+            <a:r>
+              <a:rPr lang="en-US" sz="1800" dirty="0"/>
+              <a:t>collects and provides regulated power to the rest of the satellite</a:t>
+            </a:r>
+          </a:p>
+          <a:p>
+            <a:r>
+              <a:rPr lang="en-US" dirty="0">
+                <a:solidFill>
+                  <a:schemeClr val="accent6"/>
+                </a:solidFill>
+              </a:rPr>
+              <a:t>Onboard Computer (OBC) </a:t>
+            </a:r>
+            <a:endParaRPr lang="en-US" sz="2200" dirty="0">
+              <a:solidFill>
+                <a:schemeClr val="accent6"/>
+              </a:solidFill>
+            </a:endParaRPr>
+          </a:p>
+          <a:p>
+            <a:pPr marL="457200" lvl="1" indent="0">
+              <a:buNone/>
+            </a:pPr>
+            <a:r>
+              <a:rPr lang="en-US" sz="1800" dirty="0"/>
+              <a:t>controls other subsystems and executes the flight software</a:t>
+            </a:r>
+          </a:p>
+          <a:p>
+            <a:r>
+              <a:rPr lang="en-US" dirty="0">
+                <a:solidFill>
+                  <a:schemeClr val="accent6"/>
+                </a:solidFill>
+              </a:rPr>
+              <a:t>Payload</a:t>
+            </a:r>
+            <a:r>
+              <a:rPr lang="en-US" dirty="0"/>
+              <a:t> </a:t>
+            </a:r>
+            <a:endParaRPr lang="en-US" sz="2200" dirty="0"/>
+          </a:p>
+          <a:p>
+            <a:pPr marL="457200" lvl="1" indent="0">
+              <a:buNone/>
+            </a:pPr>
+            <a:r>
+              <a:rPr lang="en-US" sz="1800" dirty="0"/>
+              <a:t>collects data to fulfil the mission objectives</a:t>
+            </a:r>
+          </a:p>
+          <a:p>
+            <a:r>
+              <a:rPr lang="en-US" dirty="0">
+                <a:solidFill>
+                  <a:schemeClr val="accent6"/>
+                </a:solidFill>
+              </a:rPr>
+              <a:t>Telemetry, Tracking, and Command (TT&amp;C) </a:t>
+            </a:r>
+            <a:endParaRPr lang="en-US" sz="2200" dirty="0">
+              <a:solidFill>
+                <a:schemeClr val="accent6"/>
+              </a:solidFill>
+            </a:endParaRPr>
+          </a:p>
+          <a:p>
+            <a:pPr marL="457200" lvl="1" indent="0">
+              <a:buNone/>
+            </a:pPr>
+            <a:r>
+              <a:rPr lang="en-US" sz="1800" dirty="0"/>
+              <a:t>provides 2-way communications between the satellite and ground</a:t>
+            </a:r>
+          </a:p>
+          <a:p>
+            <a:r>
+              <a:rPr lang="en-US" dirty="0">
+                <a:solidFill>
+                  <a:schemeClr val="accent6"/>
+                </a:solidFill>
+              </a:rPr>
+              <a:t>Attitude and Orbital Control Subsystem (AOCS) </a:t>
+            </a:r>
+            <a:endParaRPr lang="en-US" sz="2200" dirty="0">
+              <a:solidFill>
+                <a:schemeClr val="accent6"/>
+              </a:solidFill>
+            </a:endParaRPr>
+          </a:p>
+          <a:p>
+            <a:pPr marL="457200" lvl="1" indent="0">
+              <a:buNone/>
+            </a:pPr>
+            <a:r>
+              <a:rPr lang="en-US" sz="1800" dirty="0"/>
+              <a:t>passively controls the attitude (orientation) of the satellite</a:t>
+            </a:r>
+          </a:p>
+          <a:p>
+            <a:endParaRPr lang="en-US" dirty="0"/>
+          </a:p>
+        </p:txBody>
+      </p:sp>
+      <p:sp>
+        <p:nvSpPr>
+          <p:cNvPr id="4" name="Footer Placeholder 3">
+            <a:extLst>
+              <a:ext uri="{FF2B5EF4-FFF2-40B4-BE49-F238E27FC236}">
+                <a16:creationId xmlns:a16="http://schemas.microsoft.com/office/drawing/2014/main" id="{487B6196-4564-4B85-A90D-87DC96F90B46}"/>
+              </a:ext>
+            </a:extLst>
+          </p:cNvPr>
+          <p:cNvSpPr>
+            <a:spLocks noGrp="1"/>
+          </p:cNvSpPr>
+          <p:nvPr>
+            <p:ph type="ftr" sz="quarter" idx="11"/>
+          </p:nvPr>
+        </p:nvSpPr>
+        <p:spPr>
+          <a:xfrm>
+            <a:off x="4038600" y="6356350"/>
+            <a:ext cx="4114800" cy="365125"/>
+          </a:xfrm>
+        </p:spPr>
+        <p:txBody>
+          <a:bodyPr anchor="ctr">
+            <a:normAutofit/>
+          </a:bodyPr>
+          <a:lstStyle/>
+          <a:p>
+            <a:pPr>
+              <a:spcAft>
+                <a:spcPts val="600"/>
+              </a:spcAft>
+            </a:pPr>
+            <a:r>
+              <a:rPr lang="en-GB"/>
+              <a:t>SUSF – UoS3 Training Scheme</a:t>
+            </a:r>
+          </a:p>
+        </p:txBody>
+      </p:sp>
+      <p:sp>
+        <p:nvSpPr>
+          <p:cNvPr id="5" name="Slide Number Placeholder 4">
+            <a:extLst>
+              <a:ext uri="{FF2B5EF4-FFF2-40B4-BE49-F238E27FC236}">
+                <a16:creationId xmlns:a16="http://schemas.microsoft.com/office/drawing/2014/main" id="{13B4D938-D829-4D3E-8E7F-23FDF3CC0402}"/>
+              </a:ext>
+            </a:extLst>
+          </p:cNvPr>
+          <p:cNvSpPr>
+            <a:spLocks noGrp="1"/>
+          </p:cNvSpPr>
+          <p:nvPr>
+            <p:ph type="sldNum" sz="quarter" idx="12"/>
+          </p:nvPr>
+        </p:nvSpPr>
+        <p:spPr>
+          <a:xfrm>
+            <a:off x="8610600" y="6356350"/>
+            <a:ext cx="2743200" cy="365125"/>
+          </a:xfrm>
+        </p:spPr>
+        <p:txBody>
+          <a:bodyPr anchor="ctr">
+            <a:normAutofit/>
+          </a:bodyPr>
+          <a:lstStyle/>
+          <a:p>
+            <a:pPr>
+              <a:spcAft>
+                <a:spcPts val="600"/>
+              </a:spcAft>
+            </a:pPr>
+            <a:fld id="{409D42ED-5227-461B-93AD-5F9E0026A866}" type="slidenum">
+              <a:rPr lang="en-GB" smtClean="0"/>
+              <a:pPr>
+                <a:spcAft>
+                  <a:spcPts val="600"/>
+                </a:spcAft>
+              </a:pPr>
+              <a:t>6</a:t>
+            </a:fld>
+            <a:endParaRPr lang="en-GB"/>
+          </a:p>
+        </p:txBody>
+      </p:sp>
+    </p:spTree>
+    <p:extLst>
+      <p:ext uri="{BB962C8B-B14F-4D97-AF65-F5344CB8AC3E}">
+        <p14:creationId xmlns:p14="http://schemas.microsoft.com/office/powerpoint/2010/main" val="1991984139"/>
+      </p:ext>
+    </p:extLst>
+  </p:cSld>
+  <p:clrMapOvr>
+    <a:masterClrMapping/>
+  </p:clrMapOvr>
+</p:sld>
+</file>
+
+<file path=ppt/slides/slide7.xml><?xml version="1.0" encoding="utf-8"?>
+<p:sld xmlns:a="http://schemas.openxmlformats.org/drawingml/2006/main" xmlns:r="http://schemas.openxmlformats.org/officeDocument/2006/relationships" xmlns:p="http://schemas.openxmlformats.org/presentationml/2006/main">
+  <p:cSld>
+    <p:spTree>
+      <p:nvGrpSpPr>
+        <p:cNvPr id="1" name=""/>
+        <p:cNvGrpSpPr/>
+        <p:nvPr/>
+      </p:nvGrpSpPr>
+      <p:grpSpPr>
+        <a:xfrm>
+          <a:off x="0" y="0"/>
+          <a:ext cx="0" cy="0"/>
+          <a:chOff x="0" y="0"/>
+          <a:chExt cx="0" cy="0"/>
+        </a:xfrm>
+      </p:grpSpPr>
+      <p:sp>
+        <p:nvSpPr>
+          <p:cNvPr id="2" name="Title 1">
+            <a:extLst>
+              <a:ext uri="{FF2B5EF4-FFF2-40B4-BE49-F238E27FC236}">
                 <a16:creationId xmlns:a16="http://schemas.microsoft.com/office/drawing/2014/main" id="{2275FC04-4451-4771-A0C3-3F800A7F122D}"/>
               </a:ext>
             </a:extLst>
@@ -5111,7 +6503,7 @@
           <a:p>
             <a:fld id="{409D42ED-5227-461B-93AD-5F9E0026A866}" type="slidenum">
               <a:rPr lang="en-GB" smtClean="0"/>
-              <a:t>6</a:t>
+              <a:t>7</a:t>
             </a:fld>
             <a:endParaRPr lang="en-GB"/>
           </a:p>
@@ -5788,7 +7180,7 @@
 </p:sld>
 </file>
 
-<file path=ppt/slides/slide7.xml><?xml version="1.0" encoding="utf-8"?>
+<file path=ppt/slides/slide8.xml><?xml version="1.0" encoding="utf-8"?>
 <p:sld xmlns:a="http://schemas.openxmlformats.org/drawingml/2006/main" xmlns:r="http://schemas.openxmlformats.org/officeDocument/2006/relationships" xmlns:p="http://schemas.openxmlformats.org/presentationml/2006/main">
   <p:cSld>
     <p:spTree>
@@ -5810,6 +7202,218 @@
           <p:cNvPr id="2" name="Title 1">
             <a:extLst>
               <a:ext uri="{FF2B5EF4-FFF2-40B4-BE49-F238E27FC236}">
+                <a16:creationId xmlns:a16="http://schemas.microsoft.com/office/drawing/2014/main" id="{707F4634-3CE6-4699-8B4E-49C6FB7755D1}"/>
+              </a:ext>
+            </a:extLst>
+          </p:cNvPr>
+          <p:cNvSpPr>
+            <a:spLocks noGrp="1"/>
+          </p:cNvSpPr>
+          <p:nvPr>
+            <p:ph type="title"/>
+          </p:nvPr>
+        </p:nvSpPr>
+        <p:spPr/>
+        <p:txBody>
+          <a:bodyPr/>
+          <a:lstStyle/>
+          <a:p>
+            <a:r>
+              <a:rPr lang="en-GB" dirty="0">
+                <a:latin typeface="Bahnschrift SemiBold Condensed"/>
+              </a:rPr>
+              <a:t>Hardware Organisation</a:t>
+            </a:r>
+            <a:endParaRPr lang="en-GB" dirty="0"/>
+          </a:p>
+        </p:txBody>
+      </p:sp>
+      <p:sp>
+        <p:nvSpPr>
+          <p:cNvPr id="3" name="Content Placeholder 2">
+            <a:extLst>
+              <a:ext uri="{FF2B5EF4-FFF2-40B4-BE49-F238E27FC236}">
+                <a16:creationId xmlns:a16="http://schemas.microsoft.com/office/drawing/2014/main" id="{BBF8E816-19FB-464B-A30F-484DE488A81B}"/>
+              </a:ext>
+            </a:extLst>
+          </p:cNvPr>
+          <p:cNvSpPr>
+            <a:spLocks noGrp="1"/>
+          </p:cNvSpPr>
+          <p:nvPr>
+            <p:ph idx="1"/>
+          </p:nvPr>
+        </p:nvSpPr>
+        <p:spPr/>
+        <p:txBody>
+          <a:bodyPr vert="horz" lIns="91440" tIns="45720" rIns="91440" bIns="45720" rtlCol="0" anchor="t">
+            <a:normAutofit/>
+          </a:bodyPr>
+          <a:lstStyle/>
+          <a:p>
+            <a:r>
+              <a:rPr lang="en-GB" dirty="0">
+                <a:cs typeface="Calibri"/>
+              </a:rPr>
+              <a:t>Two main circuit boards need development:</a:t>
+            </a:r>
+          </a:p>
+          <a:p>
+            <a:pPr lvl="1"/>
+            <a:r>
+              <a:rPr lang="en-GB" dirty="0">
+                <a:cs typeface="Calibri"/>
+              </a:rPr>
+              <a:t>EPS</a:t>
+            </a:r>
+          </a:p>
+          <a:p>
+            <a:pPr lvl="2"/>
+            <a:r>
+              <a:rPr lang="en-GB" dirty="0">
+                <a:cs typeface="Calibri"/>
+              </a:rPr>
+              <a:t>contains: the EPS microcontroller (MCU), connectors for solar panels and battery, voltage regulation circuitry</a:t>
+            </a:r>
+          </a:p>
+          <a:p>
+            <a:pPr lvl="2"/>
+            <a:r>
+              <a:rPr lang="en-GB" dirty="0">
+                <a:cs typeface="Calibri"/>
+              </a:rPr>
+              <a:t>status: problems with boards have been identified and fixed in design, needs new PCB ordered and assembled, which will be engineering qualification model (EQM)</a:t>
+            </a:r>
+          </a:p>
+          <a:p>
+            <a:pPr lvl="1"/>
+            <a:r>
+              <a:rPr lang="en-GB" dirty="0">
+                <a:cs typeface="Calibri"/>
+              </a:rPr>
+              <a:t>Telecommunications and Onboard Computer (TOBC)</a:t>
+            </a:r>
+          </a:p>
+          <a:p>
+            <a:pPr lvl="2"/>
+            <a:r>
+              <a:rPr lang="en-GB" dirty="0">
+                <a:cs typeface="Calibri"/>
+              </a:rPr>
+              <a:t>contains: the OBC MCU, the TX Manager MCU, the radio communications circuitry, IMU, auxiliary OBC components like FRAM</a:t>
+            </a:r>
+          </a:p>
+          <a:p>
+            <a:pPr lvl="2"/>
+            <a:r>
+              <a:rPr lang="en-GB" dirty="0">
+                <a:cs typeface="Calibri"/>
+              </a:rPr>
+              <a:t>status: faults found and corrected in design, needs new PCB ordered and assembled, which should be EQM</a:t>
+            </a:r>
+          </a:p>
+          <a:p>
+            <a:r>
+              <a:rPr lang="en-GB" dirty="0">
+                <a:cs typeface="Calibri"/>
+              </a:rPr>
+              <a:t>Other boards include the battery, AOCS, and camera</a:t>
+            </a:r>
+          </a:p>
+        </p:txBody>
+      </p:sp>
+      <p:sp>
+        <p:nvSpPr>
+          <p:cNvPr id="4" name="Footer Placeholder 3">
+            <a:extLst>
+              <a:ext uri="{FF2B5EF4-FFF2-40B4-BE49-F238E27FC236}">
+                <a16:creationId xmlns:a16="http://schemas.microsoft.com/office/drawing/2014/main" id="{95791B53-F40C-4E46-A397-CA01D2C9D917}"/>
+              </a:ext>
+            </a:extLst>
+          </p:cNvPr>
+          <p:cNvSpPr>
+            <a:spLocks noGrp="1"/>
+          </p:cNvSpPr>
+          <p:nvPr>
+            <p:ph type="ftr" sz="quarter" idx="11"/>
+          </p:nvPr>
+        </p:nvSpPr>
+        <p:spPr/>
+        <p:txBody>
+          <a:bodyPr/>
+          <a:lstStyle/>
+          <a:p>
+            <a:r>
+              <a:rPr lang="en-GB"/>
+              <a:t>SUSF – UoS3 Training Scheme</a:t>
+            </a:r>
+          </a:p>
+        </p:txBody>
+      </p:sp>
+      <p:sp>
+        <p:nvSpPr>
+          <p:cNvPr id="5" name="Slide Number Placeholder 4">
+            <a:extLst>
+              <a:ext uri="{FF2B5EF4-FFF2-40B4-BE49-F238E27FC236}">
+                <a16:creationId xmlns:a16="http://schemas.microsoft.com/office/drawing/2014/main" id="{27707037-EF0A-4C98-8A84-DF0CFA73F994}"/>
+              </a:ext>
+            </a:extLst>
+          </p:cNvPr>
+          <p:cNvSpPr>
+            <a:spLocks noGrp="1"/>
+          </p:cNvSpPr>
+          <p:nvPr>
+            <p:ph type="sldNum" sz="quarter" idx="12"/>
+          </p:nvPr>
+        </p:nvSpPr>
+        <p:spPr/>
+        <p:txBody>
+          <a:bodyPr/>
+          <a:lstStyle/>
+          <a:p>
+            <a:fld id="{409D42ED-5227-461B-93AD-5F9E0026A866}" type="slidenum">
+              <a:rPr lang="en-GB" smtClean="0"/>
+              <a:t>8</a:t>
+            </a:fld>
+            <a:endParaRPr lang="en-GB"/>
+          </a:p>
+        </p:txBody>
+      </p:sp>
+    </p:spTree>
+    <p:extLst>
+      <p:ext uri="{BB962C8B-B14F-4D97-AF65-F5344CB8AC3E}">
+        <p14:creationId xmlns:p14="http://schemas.microsoft.com/office/powerpoint/2010/main" val="1491277749"/>
+      </p:ext>
+    </p:extLst>
+  </p:cSld>
+  <p:clrMapOvr>
+    <a:masterClrMapping/>
+  </p:clrMapOvr>
+</p:sld>
+</file>
+
+<file path=ppt/slides/slide9.xml><?xml version="1.0" encoding="utf-8"?>
+<p:sld xmlns:a="http://schemas.openxmlformats.org/drawingml/2006/main" xmlns:r="http://schemas.openxmlformats.org/officeDocument/2006/relationships" xmlns:p="http://schemas.openxmlformats.org/presentationml/2006/main">
+  <p:cSld>
+    <p:spTree>
+      <p:nvGrpSpPr>
+        <p:cNvPr id="1" name=""/>
+        <p:cNvGrpSpPr/>
+        <p:nvPr/>
+      </p:nvGrpSpPr>
+      <p:grpSpPr>
+        <a:xfrm>
+          <a:off x="0" y="0"/>
+          <a:ext cx="0" cy="0"/>
+          <a:chOff x="0" y="0"/>
+          <a:chExt cx="0" cy="0"/>
+        </a:xfrm>
+      </p:grpSpPr>
+      <p:sp>
+        <p:nvSpPr>
+          <p:cNvPr id="2" name="Title 1">
+            <a:extLst>
+              <a:ext uri="{FF2B5EF4-FFF2-40B4-BE49-F238E27FC236}">
                 <a16:creationId xmlns:a16="http://schemas.microsoft.com/office/drawing/2014/main" id="{BD6A3833-FB2E-4163-B2C3-7D6F0ABD31DD}"/>
               </a:ext>
             </a:extLst>
@@ -5952,7 +7556,7 @@
           <a:p>
             <a:fld id="{409D42ED-5227-461B-93AD-5F9E0026A866}" type="slidenum">
               <a:rPr lang="en-GB" smtClean="0"/>
-              <a:t>7</a:t>
+              <a:t>9</a:t>
             </a:fld>
             <a:endParaRPr lang="en-GB"/>
           </a:p>

</xml_diff>

<commit_message>
Fixed link in system overview
</commit_message>
<xml_diff>
--- a/platform/UTS_SystemOverview.pptx
+++ b/platform/UTS_SystemOverview.pptx
@@ -130,6 +130,7 @@
 <file path=ppt/revisionInfo.xml><?xml version="1.0" encoding="utf-8"?>
 <p1510:revInfo xmlns:a="http://schemas.openxmlformats.org/drawingml/2006/main" xmlns:r="http://schemas.openxmlformats.org/officeDocument/2006/relationships" xmlns:p1510="http://schemas.microsoft.com/office/powerpoint/2015/10/main">
   <p1510:revLst>
+    <p1510:client id="{51FDF22D-2EDF-4EC8-AD76-13D303093778}" v="2" dt="2021-09-15T16:03:05.461"/>
     <p1510:client id="{779D95B1-DD83-4EC7-A87B-85275740A602}" v="3534" dt="2021-09-15T09:30:54.026"/>
     <p1510:client id="{9CD0B318-7276-4137-900B-454230291036}" v="51" dt="2021-09-15T09:42:42.564"/>
   </p1510:revLst>
@@ -157,6 +158,30 @@
             <pc:docMk/>
             <pc:sldMk cId="3660392004" sldId="268"/>
             <ac:spMk id="3" creationId="{D4AC85E3-8E37-4B14-A642-E502BBC21591}"/>
+          </ac:spMkLst>
+        </pc:spChg>
+      </pc:sldChg>
+    </pc:docChg>
+  </pc:docChgLst>
+  <pc:docChgLst>
+    <pc:chgData name="Duncan Hamill (dh2g16)" userId="S::dh2g16@soton.ac.uk::c4621985-953c-4e7b-8d56-8ff6722da9ff" providerId="AD" clId="Web-{51FDF22D-2EDF-4EC8-AD76-13D303093778}"/>
+    <pc:docChg chg="modSld">
+      <pc:chgData name="Duncan Hamill (dh2g16)" userId="S::dh2g16@soton.ac.uk::c4621985-953c-4e7b-8d56-8ff6722da9ff" providerId="AD" clId="Web-{51FDF22D-2EDF-4EC8-AD76-13D303093778}" dt="2021-09-15T16:03:05.461" v="1" actId="20577"/>
+      <pc:docMkLst>
+        <pc:docMk/>
+      </pc:docMkLst>
+      <pc:sldChg chg="modSp">
+        <pc:chgData name="Duncan Hamill (dh2g16)" userId="S::dh2g16@soton.ac.uk::c4621985-953c-4e7b-8d56-8ff6722da9ff" providerId="AD" clId="Web-{51FDF22D-2EDF-4EC8-AD76-13D303093778}" dt="2021-09-15T16:03:05.461" v="1" actId="20577"/>
+        <pc:sldMkLst>
+          <pc:docMk/>
+          <pc:sldMk cId="938831069" sldId="266"/>
+        </pc:sldMkLst>
+        <pc:spChg chg="mod">
+          <ac:chgData name="Duncan Hamill (dh2g16)" userId="S::dh2g16@soton.ac.uk::c4621985-953c-4e7b-8d56-8ff6722da9ff" providerId="AD" clId="Web-{51FDF22D-2EDF-4EC8-AD76-13D303093778}" dt="2021-09-15T16:03:05.461" v="1" actId="20577"/>
+          <ac:spMkLst>
+            <pc:docMk/>
+            <pc:sldMk cId="938831069" sldId="266"/>
+            <ac:spMk id="3" creationId="{14976112-3D0F-4450-9F27-938E24621DE9}"/>
           </ac:spMkLst>
         </pc:spChg>
       </pc:sldChg>
@@ -4289,7 +4314,7 @@
         <p:spPr/>
         <p:txBody>
           <a:bodyPr vert="horz" lIns="91440" tIns="45720" rIns="91440" bIns="45720" rtlCol="0" anchor="t">
-            <a:normAutofit lnSpcReduction="10000"/>
+            <a:normAutofit/>
           </a:bodyPr>
           <a:lstStyle/>
           <a:p>
@@ -4374,22 +4399,9 @@
             <a:pPr marL="457200" lvl="1" indent="0">
               <a:buNone/>
             </a:pPr>
-            <a:r>
-              <a:rPr lang="en-GB" sz="1300" dirty="0">
-                <a:ea typeface="+mn-lt"/>
-                <a:cs typeface="+mn-lt"/>
-                <a:hlinkClick r:id="rId2"/>
-              </a:rPr>
-              <a:t>https://sotonac.sharepoint.com/:f:/r/teams/UniversityofSouthamptonSmallSatelliteUoS3/FEE%20GDP%20202021/EPS/Power_Boardv3.2_270321?csf=1&amp;web=1&amp;e=u4JDre</a:t>
-            </a:r>
-            <a:r>
-              <a:rPr lang="en-GB" sz="1300" dirty="0">
-                <a:ea typeface="+mn-lt"/>
-                <a:cs typeface="+mn-lt"/>
-              </a:rPr>
-              <a:t> </a:t>
-            </a:r>
-            <a:endParaRPr lang="en-GB" sz="1300"/>
+            <a:endParaRPr lang="en-GB" sz="1300" dirty="0">
+              <a:cs typeface="Calibri"/>
+            </a:endParaRPr>
           </a:p>
           <a:p>
             <a:endParaRPr lang="en-GB" sz="1800" dirty="0">

</xml_diff>